<commit_message>
zárójeles területek (pl. műszaki informatika) kezelése Scholarban hosszú részstring kezelése
</commit_message>
<xml_diff>
--- a/Publikációs listák szinkronizálása.pptx
+++ b/Publikációs listák szinkronizálása.pptx
@@ -5,21 +5,28 @@
     <p:sldMasterId id="2147483660" r:id="rId4"/>
   </p:sldMasterIdLst>
   <p:notesMasterIdLst>
-    <p:notesMasterId r:id="rId14"/>
+    <p:notesMasterId r:id="rId21"/>
   </p:notesMasterIdLst>
   <p:handoutMasterIdLst>
-    <p:handoutMasterId r:id="rId15"/>
+    <p:handoutMasterId r:id="rId22"/>
   </p:handoutMasterIdLst>
   <p:sldIdLst>
     <p:sldId id="264" r:id="rId5"/>
     <p:sldId id="276" r:id="rId6"/>
-    <p:sldId id="280" r:id="rId7"/>
-    <p:sldId id="281" r:id="rId8"/>
-    <p:sldId id="279" r:id="rId9"/>
-    <p:sldId id="282" r:id="rId10"/>
-    <p:sldId id="283" r:id="rId11"/>
-    <p:sldId id="284" r:id="rId12"/>
-    <p:sldId id="266" r:id="rId13"/>
+    <p:sldId id="279" r:id="rId7"/>
+    <p:sldId id="282" r:id="rId8"/>
+    <p:sldId id="295" r:id="rId9"/>
+    <p:sldId id="293" r:id="rId10"/>
+    <p:sldId id="294" r:id="rId11"/>
+    <p:sldId id="292" r:id="rId12"/>
+    <p:sldId id="285" r:id="rId13"/>
+    <p:sldId id="291" r:id="rId14"/>
+    <p:sldId id="287" r:id="rId15"/>
+    <p:sldId id="288" r:id="rId16"/>
+    <p:sldId id="286" r:id="rId17"/>
+    <p:sldId id="289" r:id="rId18"/>
+    <p:sldId id="290" r:id="rId19"/>
+    <p:sldId id="266" r:id="rId20"/>
   </p:sldIdLst>
   <p:sldSz cx="12188825" cy="6858000"/>
   <p:notesSz cx="6858000" cy="9144000"/>
@@ -3359,7 +3366,7 @@
                 </a:solidFill>
               </a:rPr>
               <a:pPr algn="r" rtl="0"/>
-              <a:t>2021. 03. 24.</a:t>
+              <a:t>2021. 05. 02.</a:t>
             </a:fld>
             <a:endParaRPr lang="hu-HU" dirty="0">
               <a:solidFill>
@@ -3553,7 +3560,7 @@
             <a:fld id="{6648EB40-417A-43B6-8398-70047EA5A74C}" type="datetime1">
               <a:rPr lang="hu-HU" smtClean="0"/>
               <a:pPr/>
-              <a:t>2021. 03. 24.</a:t>
+              <a:t>2021. 05. 02.</a:t>
             </a:fld>
             <a:endParaRPr lang="hu-HU" dirty="0"/>
           </a:p>
@@ -4252,7 +4259,7 @@
             <a:fld id="{56E2763D-E032-4DFF-B0B3-3D8422FFCF0E}" type="datetime1">
               <a:rPr lang="hu-HU" smtClean="0"/>
               <a:pPr/>
-              <a:t>2021. 03. 24.</a:t>
+              <a:t>2021. 05. 02.</a:t>
             </a:fld>
             <a:endParaRPr lang="hu-HU" dirty="0"/>
           </a:p>
@@ -4456,7 +4463,7 @@
             <a:fld id="{457ABD3E-B90B-44E6-BFFE-432971789295}" type="datetime1">
               <a:rPr lang="hu-HU" smtClean="0"/>
               <a:pPr/>
-              <a:t>2021. 03. 24.</a:t>
+              <a:t>2021. 05. 02.</a:t>
             </a:fld>
             <a:endParaRPr lang="hu-HU" dirty="0"/>
           </a:p>
@@ -4666,7 +4673,7 @@
             <a:fld id="{116C6E60-1866-4758-8791-4C4E45C36254}" type="datetime1">
               <a:rPr lang="hu-HU" smtClean="0"/>
               <a:pPr/>
-              <a:t>2021. 03. 24.</a:t>
+              <a:t>2021. 05. 02.</a:t>
             </a:fld>
             <a:endParaRPr lang="hu-HU" dirty="0"/>
           </a:p>
@@ -5195,7 +5202,7 @@
             <a:fld id="{3A8FF994-63F4-4649-B3EC-87876C8F5873}" type="datetime1">
               <a:rPr lang="hu-HU" smtClean="0"/>
               <a:pPr/>
-              <a:t>2021. 03. 24.</a:t>
+              <a:t>2021. 05. 02.</a:t>
             </a:fld>
             <a:endParaRPr lang="hu-HU" dirty="0"/>
           </a:p>
@@ -5647,7 +5654,7 @@
             <a:fld id="{DBE2DD76-DA38-4175-BA3B-63CD08093EE0}" type="datetime1">
               <a:rPr lang="hu-HU" smtClean="0"/>
               <a:pPr/>
-              <a:t>2021. 03. 24.</a:t>
+              <a:t>2021. 05. 02.</a:t>
             </a:fld>
             <a:endParaRPr lang="hu-HU" dirty="0"/>
           </a:p>
@@ -5789,7 +5796,7 @@
             <a:fld id="{7A77CE3F-4691-403E-A0B4-65592C908B08}" type="datetime1">
               <a:rPr lang="hu-HU" smtClean="0"/>
               <a:pPr/>
-              <a:t>2021. 03. 24.</a:t>
+              <a:t>2021. 05. 02.</a:t>
             </a:fld>
             <a:endParaRPr lang="hu-HU" dirty="0"/>
           </a:p>
@@ -5903,7 +5910,7 @@
             <a:fld id="{24C7133D-4DC0-4E2A-8D81-F8B473E814B4}" type="datetime1">
               <a:rPr lang="hu-HU" smtClean="0"/>
               <a:pPr/>
-              <a:t>2021. 03. 24.</a:t>
+              <a:t>2021. 05. 02.</a:t>
             </a:fld>
             <a:endParaRPr lang="hu-HU" dirty="0"/>
           </a:p>
@@ -6268,7 +6275,7 @@
             <a:fld id="{D378BBDA-88A6-480E-A129-7B2F79ABA348}" type="datetime1">
               <a:rPr lang="hu-HU" smtClean="0"/>
               <a:pPr/>
-              <a:t>2021. 03. 24.</a:t>
+              <a:t>2021. 05. 02.</a:t>
             </a:fld>
             <a:endParaRPr lang="hu-HU" dirty="0"/>
           </a:p>
@@ -6614,7 +6621,7 @@
             <a:fld id="{9A81C038-294F-4567-9ADB-CFB54F107354}" type="datetime1">
               <a:rPr lang="hu-HU" smtClean="0"/>
               <a:pPr/>
-              <a:t>2021. 03. 24.</a:t>
+              <a:t>2021. 05. 02.</a:t>
             </a:fld>
             <a:endParaRPr lang="hu-HU" dirty="0"/>
           </a:p>
@@ -6910,7 +6917,7 @@
             <a:fld id="{982AADB5-EBED-4173-BC4E-244A8186BD03}" type="datetime1">
               <a:rPr lang="hu-HU" smtClean="0"/>
               <a:pPr/>
-              <a:t>2021. 03. 24.</a:t>
+              <a:t>2021. 05. 02.</a:t>
             </a:fld>
             <a:endParaRPr lang="hu-HU" dirty="0"/>
           </a:p>
@@ -7589,6 +7596,901 @@
 </p:sld>
 </file>
 
+<file path=ppt/slides/slide10.xml><?xml version="1.0" encoding="utf-8"?>
+<p:sld xmlns:a="http://schemas.openxmlformats.org/drawingml/2006/main" xmlns:r="http://schemas.openxmlformats.org/officeDocument/2006/relationships" xmlns:p="http://schemas.openxmlformats.org/presentationml/2006/main">
+  <p:cSld>
+    <p:spTree>
+      <p:nvGrpSpPr>
+        <p:cNvPr id="1" name=""/>
+        <p:cNvGrpSpPr/>
+        <p:nvPr/>
+      </p:nvGrpSpPr>
+      <p:grpSpPr>
+        <a:xfrm>
+          <a:off x="0" y="0"/>
+          <a:ext cx="0" cy="0"/>
+          <a:chOff x="0" y="0"/>
+          <a:chExt cx="0" cy="0"/>
+        </a:xfrm>
+      </p:grpSpPr>
+      <p:sp>
+        <p:nvSpPr>
+          <p:cNvPr id="2" name="Cím 1">
+            <a:extLst>
+              <a:ext uri="{FF2B5EF4-FFF2-40B4-BE49-F238E27FC236}">
+                <a16:creationId xmlns:a16="http://schemas.microsoft.com/office/drawing/2014/main" id="{DDC6C8C9-8BC4-405C-B8F8-DE93CC130207}"/>
+              </a:ext>
+            </a:extLst>
+          </p:cNvPr>
+          <p:cNvSpPr>
+            <a:spLocks noGrp="1"/>
+          </p:cNvSpPr>
+          <p:nvPr>
+            <p:ph type="title"/>
+          </p:nvPr>
+        </p:nvSpPr>
+        <p:spPr/>
+        <p:txBody>
+          <a:bodyPr/>
+          <a:lstStyle/>
+          <a:p>
+            <a:r>
+              <a:rPr lang="hu-HU" dirty="0"/>
+              <a:t>Késleltetés beállítás</a:t>
+            </a:r>
+          </a:p>
+        </p:txBody>
+      </p:sp>
+      <p:sp>
+        <p:nvSpPr>
+          <p:cNvPr id="3" name="Tartalom helye 2">
+            <a:extLst>
+              <a:ext uri="{FF2B5EF4-FFF2-40B4-BE49-F238E27FC236}">
+                <a16:creationId xmlns:a16="http://schemas.microsoft.com/office/drawing/2014/main" id="{5F930462-0DC3-41CC-B8BA-4A2FB9CF0C03}"/>
+              </a:ext>
+            </a:extLst>
+          </p:cNvPr>
+          <p:cNvSpPr>
+            <a:spLocks noGrp="1"/>
+          </p:cNvSpPr>
+          <p:nvPr>
+            <p:ph sz="half" idx="1"/>
+          </p:nvPr>
+        </p:nvSpPr>
+        <p:spPr/>
+        <p:txBody>
+          <a:bodyPr/>
+          <a:lstStyle/>
+          <a:p>
+            <a:endParaRPr lang="hu-HU"/>
+          </a:p>
+        </p:txBody>
+      </p:sp>
+      <p:pic>
+        <p:nvPicPr>
+          <p:cNvPr id="9" name="Tartalom helye 8">
+            <a:extLst>
+              <a:ext uri="{FF2B5EF4-FFF2-40B4-BE49-F238E27FC236}">
+                <a16:creationId xmlns:a16="http://schemas.microsoft.com/office/drawing/2014/main" id="{CC96BA58-96D8-47A0-A754-1F595CACE210}"/>
+              </a:ext>
+            </a:extLst>
+          </p:cNvPr>
+          <p:cNvPicPr>
+            <a:picLocks noGrp="1" noChangeAspect="1"/>
+          </p:cNvPicPr>
+          <p:nvPr>
+            <p:ph sz="half" idx="2"/>
+          </p:nvPr>
+        </p:nvPicPr>
+        <p:blipFill>
+          <a:blip r:embed="rId2"/>
+          <a:stretch>
+            <a:fillRect/>
+          </a:stretch>
+        </p:blipFill>
+        <p:spPr>
+          <a:xfrm>
+            <a:off x="6297613" y="2097049"/>
+            <a:ext cx="4976812" cy="3679902"/>
+          </a:xfrm>
+          <a:prstGeom prst="rect">
+            <a:avLst/>
+          </a:prstGeom>
+        </p:spPr>
+      </p:pic>
+    </p:spTree>
+    <p:extLst>
+      <p:ext uri="{BB962C8B-B14F-4D97-AF65-F5344CB8AC3E}">
+        <p14:creationId xmlns:p14="http://schemas.microsoft.com/office/powerpoint/2010/main" val="513559910"/>
+      </p:ext>
+    </p:extLst>
+  </p:cSld>
+  <p:clrMapOvr>
+    <a:masterClrMapping/>
+  </p:clrMapOvr>
+  <mc:AlternateContent xmlns:mc="http://schemas.openxmlformats.org/markup-compatibility/2006" xmlns:p14="http://schemas.microsoft.com/office/powerpoint/2010/main">
+    <mc:Choice Requires="p14">
+      <p:transition spd="med" p14:dur="700">
+        <p:fade/>
+      </p:transition>
+    </mc:Choice>
+    <mc:Fallback xmlns="">
+      <p:transition spd="med">
+        <p:fade/>
+      </p:transition>
+    </mc:Fallback>
+  </mc:AlternateContent>
+</p:sld>
+</file>
+
+<file path=ppt/slides/slide11.xml><?xml version="1.0" encoding="utf-8"?>
+<p:sld xmlns:a="http://schemas.openxmlformats.org/drawingml/2006/main" xmlns:r="http://schemas.openxmlformats.org/officeDocument/2006/relationships" xmlns:p="http://schemas.openxmlformats.org/presentationml/2006/main">
+  <p:cSld>
+    <p:spTree>
+      <p:nvGrpSpPr>
+        <p:cNvPr id="1" name=""/>
+        <p:cNvGrpSpPr/>
+        <p:nvPr/>
+      </p:nvGrpSpPr>
+      <p:grpSpPr>
+        <a:xfrm>
+          <a:off x="0" y="0"/>
+          <a:ext cx="0" cy="0"/>
+          <a:chOff x="0" y="0"/>
+          <a:chExt cx="0" cy="0"/>
+        </a:xfrm>
+      </p:grpSpPr>
+      <p:sp>
+        <p:nvSpPr>
+          <p:cNvPr id="2" name="Cím 1">
+            <a:extLst>
+              <a:ext uri="{FF2B5EF4-FFF2-40B4-BE49-F238E27FC236}">
+                <a16:creationId xmlns:a16="http://schemas.microsoft.com/office/drawing/2014/main" id="{A29295E7-FA67-4269-8768-3FCBF4E40396}"/>
+              </a:ext>
+            </a:extLst>
+          </p:cNvPr>
+          <p:cNvSpPr>
+            <a:spLocks noGrp="1"/>
+          </p:cNvSpPr>
+          <p:nvPr>
+            <p:ph type="title"/>
+          </p:nvPr>
+        </p:nvSpPr>
+        <p:spPr/>
+        <p:txBody>
+          <a:bodyPr/>
+          <a:lstStyle/>
+          <a:p>
+            <a:r>
+              <a:rPr lang="hu-HU" dirty="0"/>
+              <a:t>Teljes cím egyezőség keresés</a:t>
+            </a:r>
+          </a:p>
+        </p:txBody>
+      </p:sp>
+      <p:sp>
+        <p:nvSpPr>
+          <p:cNvPr id="3" name="Tartalom helye 2">
+            <a:extLst>
+              <a:ext uri="{FF2B5EF4-FFF2-40B4-BE49-F238E27FC236}">
+                <a16:creationId xmlns:a16="http://schemas.microsoft.com/office/drawing/2014/main" id="{D7EE7EA0-2C64-4789-BCB6-A765E9848849}"/>
+              </a:ext>
+            </a:extLst>
+          </p:cNvPr>
+          <p:cNvSpPr>
+            <a:spLocks noGrp="1"/>
+          </p:cNvSpPr>
+          <p:nvPr>
+            <p:ph sz="half" idx="1"/>
+          </p:nvPr>
+        </p:nvSpPr>
+        <p:spPr/>
+        <p:txBody>
+          <a:bodyPr/>
+          <a:lstStyle/>
+          <a:p>
+            <a:endParaRPr lang="hu-HU"/>
+          </a:p>
+        </p:txBody>
+      </p:sp>
+      <p:pic>
+        <p:nvPicPr>
+          <p:cNvPr id="9" name="Tartalom helye 8">
+            <a:extLst>
+              <a:ext uri="{FF2B5EF4-FFF2-40B4-BE49-F238E27FC236}">
+                <a16:creationId xmlns:a16="http://schemas.microsoft.com/office/drawing/2014/main" id="{7CD1CCBD-A9C0-474F-8511-E61FC88DB4C0}"/>
+              </a:ext>
+            </a:extLst>
+          </p:cNvPr>
+          <p:cNvPicPr>
+            <a:picLocks noGrp="1" noChangeAspect="1"/>
+          </p:cNvPicPr>
+          <p:nvPr>
+            <p:ph sz="half" idx="2"/>
+          </p:nvPr>
+        </p:nvPicPr>
+        <p:blipFill>
+          <a:blip r:embed="rId2"/>
+          <a:stretch>
+            <a:fillRect/>
+          </a:stretch>
+        </p:blipFill>
+        <p:spPr>
+          <a:xfrm>
+            <a:off x="6297613" y="2224549"/>
+            <a:ext cx="4976812" cy="3424902"/>
+          </a:xfrm>
+          <a:prstGeom prst="rect">
+            <a:avLst/>
+          </a:prstGeom>
+        </p:spPr>
+      </p:pic>
+    </p:spTree>
+    <p:extLst>
+      <p:ext uri="{BB962C8B-B14F-4D97-AF65-F5344CB8AC3E}">
+        <p14:creationId xmlns:p14="http://schemas.microsoft.com/office/powerpoint/2010/main" val="3081552256"/>
+      </p:ext>
+    </p:extLst>
+  </p:cSld>
+  <p:clrMapOvr>
+    <a:masterClrMapping/>
+  </p:clrMapOvr>
+  <mc:AlternateContent xmlns:mc="http://schemas.openxmlformats.org/markup-compatibility/2006" xmlns:p14="http://schemas.microsoft.com/office/powerpoint/2010/main">
+    <mc:Choice Requires="p14">
+      <p:transition spd="med" p14:dur="700">
+        <p:fade/>
+      </p:transition>
+    </mc:Choice>
+    <mc:Fallback xmlns="">
+      <p:transition spd="med">
+        <p:fade/>
+      </p:transition>
+    </mc:Fallback>
+  </mc:AlternateContent>
+</p:sld>
+</file>
+
+<file path=ppt/slides/slide12.xml><?xml version="1.0" encoding="utf-8"?>
+<p:sld xmlns:a="http://schemas.openxmlformats.org/drawingml/2006/main" xmlns:r="http://schemas.openxmlformats.org/officeDocument/2006/relationships" xmlns:p="http://schemas.openxmlformats.org/presentationml/2006/main">
+  <p:cSld>
+    <p:spTree>
+      <p:nvGrpSpPr>
+        <p:cNvPr id="1" name=""/>
+        <p:cNvGrpSpPr/>
+        <p:nvPr/>
+      </p:nvGrpSpPr>
+      <p:grpSpPr>
+        <a:xfrm>
+          <a:off x="0" y="0"/>
+          <a:ext cx="0" cy="0"/>
+          <a:chOff x="0" y="0"/>
+          <a:chExt cx="0" cy="0"/>
+        </a:xfrm>
+      </p:grpSpPr>
+      <p:sp>
+        <p:nvSpPr>
+          <p:cNvPr id="2" name="Cím 1">
+            <a:extLst>
+              <a:ext uri="{FF2B5EF4-FFF2-40B4-BE49-F238E27FC236}">
+                <a16:creationId xmlns:a16="http://schemas.microsoft.com/office/drawing/2014/main" id="{CCFEEA44-A3E8-43DD-8668-FF9A754C28F4}"/>
+              </a:ext>
+            </a:extLst>
+          </p:cNvPr>
+          <p:cNvSpPr>
+            <a:spLocks noGrp="1"/>
+          </p:cNvSpPr>
+          <p:nvPr>
+            <p:ph type="title"/>
+          </p:nvPr>
+        </p:nvSpPr>
+        <p:spPr/>
+        <p:txBody>
+          <a:bodyPr/>
+          <a:lstStyle/>
+          <a:p>
+            <a:r>
+              <a:rPr lang="hu-HU" dirty="0"/>
+              <a:t>Részcím egyezőség vizsgálata</a:t>
+            </a:r>
+          </a:p>
+        </p:txBody>
+      </p:sp>
+      <p:sp>
+        <p:nvSpPr>
+          <p:cNvPr id="3" name="Tartalom helye 2">
+            <a:extLst>
+              <a:ext uri="{FF2B5EF4-FFF2-40B4-BE49-F238E27FC236}">
+                <a16:creationId xmlns:a16="http://schemas.microsoft.com/office/drawing/2014/main" id="{D0F817A8-F5DC-484E-AAB1-6DBDA448054D}"/>
+              </a:ext>
+            </a:extLst>
+          </p:cNvPr>
+          <p:cNvSpPr>
+            <a:spLocks noGrp="1"/>
+          </p:cNvSpPr>
+          <p:nvPr>
+            <p:ph sz="half" idx="1"/>
+          </p:nvPr>
+        </p:nvSpPr>
+        <p:spPr/>
+        <p:txBody>
+          <a:bodyPr/>
+          <a:lstStyle/>
+          <a:p>
+            <a:endParaRPr lang="hu-HU"/>
+          </a:p>
+        </p:txBody>
+      </p:sp>
+      <p:pic>
+        <p:nvPicPr>
+          <p:cNvPr id="5" name="Tartalom helye 4">
+            <a:extLst>
+              <a:ext uri="{FF2B5EF4-FFF2-40B4-BE49-F238E27FC236}">
+                <a16:creationId xmlns:a16="http://schemas.microsoft.com/office/drawing/2014/main" id="{BA02F233-AB63-42E8-9012-B2660DB2835D}"/>
+              </a:ext>
+            </a:extLst>
+          </p:cNvPr>
+          <p:cNvPicPr>
+            <a:picLocks noGrp="1" noChangeAspect="1"/>
+          </p:cNvPicPr>
+          <p:nvPr>
+            <p:ph sz="half" idx="2"/>
+          </p:nvPr>
+        </p:nvPicPr>
+        <p:blipFill>
+          <a:blip r:embed="rId2"/>
+          <a:stretch>
+            <a:fillRect/>
+          </a:stretch>
+        </p:blipFill>
+        <p:spPr>
+          <a:xfrm>
+            <a:off x="3066806" y="2492896"/>
+            <a:ext cx="8207858" cy="3664903"/>
+          </a:xfrm>
+          <a:prstGeom prst="rect">
+            <a:avLst/>
+          </a:prstGeom>
+        </p:spPr>
+      </p:pic>
+    </p:spTree>
+    <p:extLst>
+      <p:ext uri="{BB962C8B-B14F-4D97-AF65-F5344CB8AC3E}">
+        <p14:creationId xmlns:p14="http://schemas.microsoft.com/office/powerpoint/2010/main" val="1798404776"/>
+      </p:ext>
+    </p:extLst>
+  </p:cSld>
+  <p:clrMapOvr>
+    <a:masterClrMapping/>
+  </p:clrMapOvr>
+  <mc:AlternateContent xmlns:mc="http://schemas.openxmlformats.org/markup-compatibility/2006" xmlns:p14="http://schemas.microsoft.com/office/powerpoint/2010/main">
+    <mc:Choice Requires="p14">
+      <p:transition spd="med" p14:dur="700">
+        <p:fade/>
+      </p:transition>
+    </mc:Choice>
+    <mc:Fallback xmlns="">
+      <p:transition spd="med">
+        <p:fade/>
+      </p:transition>
+    </mc:Fallback>
+  </mc:AlternateContent>
+</p:sld>
+</file>
+
+<file path=ppt/slides/slide13.xml><?xml version="1.0" encoding="utf-8"?>
+<p:sld xmlns:a="http://schemas.openxmlformats.org/drawingml/2006/main" xmlns:r="http://schemas.openxmlformats.org/officeDocument/2006/relationships" xmlns:p="http://schemas.openxmlformats.org/presentationml/2006/main">
+  <p:cSld>
+    <p:spTree>
+      <p:nvGrpSpPr>
+        <p:cNvPr id="1" name=""/>
+        <p:cNvGrpSpPr/>
+        <p:nvPr/>
+      </p:nvGrpSpPr>
+      <p:grpSpPr>
+        <a:xfrm>
+          <a:off x="0" y="0"/>
+          <a:ext cx="0" cy="0"/>
+          <a:chOff x="0" y="0"/>
+          <a:chExt cx="0" cy="0"/>
+        </a:xfrm>
+      </p:grpSpPr>
+      <p:sp>
+        <p:nvSpPr>
+          <p:cNvPr id="2" name="Cím 1">
+            <a:extLst>
+              <a:ext uri="{FF2B5EF4-FFF2-40B4-BE49-F238E27FC236}">
+                <a16:creationId xmlns:a16="http://schemas.microsoft.com/office/drawing/2014/main" id="{02AA0DA2-C084-4180-9A1D-D1716CD7C6E6}"/>
+              </a:ext>
+            </a:extLst>
+          </p:cNvPr>
+          <p:cNvSpPr>
+            <a:spLocks noGrp="1"/>
+          </p:cNvSpPr>
+          <p:nvPr>
+            <p:ph type="title"/>
+          </p:nvPr>
+        </p:nvSpPr>
+        <p:spPr/>
+        <p:txBody>
+          <a:bodyPr/>
+          <a:lstStyle/>
+          <a:p>
+            <a:r>
+              <a:rPr lang="hu-HU" dirty="0"/>
+              <a:t>Túl hosszú karaktersorozat egyezésének vizsgálata</a:t>
+            </a:r>
+          </a:p>
+        </p:txBody>
+      </p:sp>
+      <p:sp>
+        <p:nvSpPr>
+          <p:cNvPr id="3" name="Tartalom helye 2">
+            <a:extLst>
+              <a:ext uri="{FF2B5EF4-FFF2-40B4-BE49-F238E27FC236}">
+                <a16:creationId xmlns:a16="http://schemas.microsoft.com/office/drawing/2014/main" id="{A667B929-90AD-4337-AC3A-8308C5E46D9F}"/>
+              </a:ext>
+            </a:extLst>
+          </p:cNvPr>
+          <p:cNvSpPr>
+            <a:spLocks noGrp="1"/>
+          </p:cNvSpPr>
+          <p:nvPr>
+            <p:ph sz="half" idx="1"/>
+          </p:nvPr>
+        </p:nvSpPr>
+        <p:spPr/>
+        <p:txBody>
+          <a:bodyPr/>
+          <a:lstStyle/>
+          <a:p>
+            <a:endParaRPr lang="hu-HU"/>
+          </a:p>
+        </p:txBody>
+      </p:sp>
+      <p:pic>
+        <p:nvPicPr>
+          <p:cNvPr id="5" name="Tartalom helye 4">
+            <a:extLst>
+              <a:ext uri="{FF2B5EF4-FFF2-40B4-BE49-F238E27FC236}">
+                <a16:creationId xmlns:a16="http://schemas.microsoft.com/office/drawing/2014/main" id="{D3D19894-F233-44EA-B6DC-261CB6CFE82E}"/>
+              </a:ext>
+            </a:extLst>
+          </p:cNvPr>
+          <p:cNvPicPr>
+            <a:picLocks noGrp="1" noChangeAspect="1"/>
+          </p:cNvPicPr>
+          <p:nvPr>
+            <p:ph sz="half" idx="2"/>
+          </p:nvPr>
+        </p:nvPicPr>
+        <p:blipFill>
+          <a:blip r:embed="rId2"/>
+          <a:stretch>
+            <a:fillRect/>
+          </a:stretch>
+        </p:blipFill>
+        <p:spPr>
+          <a:xfrm>
+            <a:off x="6297613" y="2206195"/>
+            <a:ext cx="4976812" cy="3461609"/>
+          </a:xfrm>
+          <a:prstGeom prst="rect">
+            <a:avLst/>
+          </a:prstGeom>
+        </p:spPr>
+      </p:pic>
+    </p:spTree>
+    <p:extLst>
+      <p:ext uri="{BB962C8B-B14F-4D97-AF65-F5344CB8AC3E}">
+        <p14:creationId xmlns:p14="http://schemas.microsoft.com/office/powerpoint/2010/main" val="3069579162"/>
+      </p:ext>
+    </p:extLst>
+  </p:cSld>
+  <p:clrMapOvr>
+    <a:masterClrMapping/>
+  </p:clrMapOvr>
+  <mc:AlternateContent xmlns:mc="http://schemas.openxmlformats.org/markup-compatibility/2006" xmlns:p14="http://schemas.microsoft.com/office/powerpoint/2010/main">
+    <mc:Choice Requires="p14">
+      <p:transition spd="med" p14:dur="700">
+        <p:fade/>
+      </p:transition>
+    </mc:Choice>
+    <mc:Fallback xmlns="">
+      <p:transition spd="med">
+        <p:fade/>
+      </p:transition>
+    </mc:Fallback>
+  </mc:AlternateContent>
+</p:sld>
+</file>
+
+<file path=ppt/slides/slide14.xml><?xml version="1.0" encoding="utf-8"?>
+<p:sld xmlns:a="http://schemas.openxmlformats.org/drawingml/2006/main" xmlns:r="http://schemas.openxmlformats.org/officeDocument/2006/relationships" xmlns:p="http://schemas.openxmlformats.org/presentationml/2006/main">
+  <p:cSld>
+    <p:spTree>
+      <p:nvGrpSpPr>
+        <p:cNvPr id="1" name=""/>
+        <p:cNvGrpSpPr/>
+        <p:nvPr/>
+      </p:nvGrpSpPr>
+      <p:grpSpPr>
+        <a:xfrm>
+          <a:off x="0" y="0"/>
+          <a:ext cx="0" cy="0"/>
+          <a:chOff x="0" y="0"/>
+          <a:chExt cx="0" cy="0"/>
+        </a:xfrm>
+      </p:grpSpPr>
+      <p:sp>
+        <p:nvSpPr>
+          <p:cNvPr id="2" name="Cím 1">
+            <a:extLst>
+              <a:ext uri="{FF2B5EF4-FFF2-40B4-BE49-F238E27FC236}">
+                <a16:creationId xmlns:a16="http://schemas.microsoft.com/office/drawing/2014/main" id="{E3C0F978-FF1B-4DA8-ADFA-8274AF4B5059}"/>
+              </a:ext>
+            </a:extLst>
+          </p:cNvPr>
+          <p:cNvSpPr>
+            <a:spLocks noGrp="1"/>
+          </p:cNvSpPr>
+          <p:nvPr>
+            <p:ph type="title"/>
+          </p:nvPr>
+        </p:nvSpPr>
+        <p:spPr/>
+        <p:txBody>
+          <a:bodyPr/>
+          <a:lstStyle/>
+          <a:p>
+            <a:r>
+              <a:rPr lang="hu-HU" dirty="0"/>
+              <a:t>Több azonos nevű szerző kezelése</a:t>
+            </a:r>
+          </a:p>
+        </p:txBody>
+      </p:sp>
+      <p:sp>
+        <p:nvSpPr>
+          <p:cNvPr id="3" name="Tartalom helye 2">
+            <a:extLst>
+              <a:ext uri="{FF2B5EF4-FFF2-40B4-BE49-F238E27FC236}">
+                <a16:creationId xmlns:a16="http://schemas.microsoft.com/office/drawing/2014/main" id="{7F23ECFD-1511-41A3-8AEC-0DFCC121CA89}"/>
+              </a:ext>
+            </a:extLst>
+          </p:cNvPr>
+          <p:cNvSpPr>
+            <a:spLocks noGrp="1"/>
+          </p:cNvSpPr>
+          <p:nvPr>
+            <p:ph sz="half" idx="1"/>
+          </p:nvPr>
+        </p:nvSpPr>
+        <p:spPr>
+          <a:xfrm>
+            <a:off x="1117308" y="4856222"/>
+            <a:ext cx="5337143" cy="1315978"/>
+          </a:xfrm>
+        </p:spPr>
+        <p:txBody>
+          <a:bodyPr/>
+          <a:lstStyle/>
+          <a:p>
+            <a:endParaRPr lang="hu-HU" dirty="0"/>
+          </a:p>
+        </p:txBody>
+      </p:sp>
+      <p:pic>
+        <p:nvPicPr>
+          <p:cNvPr id="6" name="Tartalom helye 5">
+            <a:extLst>
+              <a:ext uri="{FF2B5EF4-FFF2-40B4-BE49-F238E27FC236}">
+                <a16:creationId xmlns:a16="http://schemas.microsoft.com/office/drawing/2014/main" id="{916E3CBD-FAFE-4915-8815-9686A1812CED}"/>
+              </a:ext>
+            </a:extLst>
+          </p:cNvPr>
+          <p:cNvPicPr>
+            <a:picLocks noGrp="1" noChangeAspect="1"/>
+          </p:cNvPicPr>
+          <p:nvPr>
+            <p:ph sz="half" idx="2"/>
+          </p:nvPr>
+        </p:nvPicPr>
+        <p:blipFill>
+          <a:blip r:embed="rId2"/>
+          <a:stretch>
+            <a:fillRect/>
+          </a:stretch>
+        </p:blipFill>
+        <p:spPr>
+          <a:xfrm>
+            <a:off x="6558935" y="2924944"/>
+            <a:ext cx="4976812" cy="3358862"/>
+          </a:xfrm>
+          <a:prstGeom prst="rect">
+            <a:avLst/>
+          </a:prstGeom>
+        </p:spPr>
+      </p:pic>
+      <p:pic>
+        <p:nvPicPr>
+          <p:cNvPr id="7" name="Kép 6">
+            <a:extLst>
+              <a:ext uri="{FF2B5EF4-FFF2-40B4-BE49-F238E27FC236}">
+                <a16:creationId xmlns:a16="http://schemas.microsoft.com/office/drawing/2014/main" id="{F7E06BC6-7D72-43B8-9EF8-F4E6CA301439}"/>
+              </a:ext>
+            </a:extLst>
+          </p:cNvPr>
+          <p:cNvPicPr>
+            <a:picLocks noChangeAspect="1"/>
+          </p:cNvPicPr>
+          <p:nvPr/>
+        </p:nvPicPr>
+        <p:blipFill>
+          <a:blip r:embed="rId3"/>
+          <a:stretch>
+            <a:fillRect/>
+          </a:stretch>
+        </p:blipFill>
+        <p:spPr>
+          <a:xfrm>
+            <a:off x="564593" y="1725047"/>
+            <a:ext cx="5631393" cy="2879328"/>
+          </a:xfrm>
+          <a:prstGeom prst="rect">
+            <a:avLst/>
+          </a:prstGeom>
+        </p:spPr>
+      </p:pic>
+    </p:spTree>
+    <p:extLst>
+      <p:ext uri="{BB962C8B-B14F-4D97-AF65-F5344CB8AC3E}">
+        <p14:creationId xmlns:p14="http://schemas.microsoft.com/office/powerpoint/2010/main" val="530296943"/>
+      </p:ext>
+    </p:extLst>
+  </p:cSld>
+  <p:clrMapOvr>
+    <a:masterClrMapping/>
+  </p:clrMapOvr>
+  <mc:AlternateContent xmlns:mc="http://schemas.openxmlformats.org/markup-compatibility/2006" xmlns:p14="http://schemas.microsoft.com/office/powerpoint/2010/main">
+    <mc:Choice Requires="p14">
+      <p:transition spd="med" p14:dur="700">
+        <p:fade/>
+      </p:transition>
+    </mc:Choice>
+    <mc:Fallback xmlns="">
+      <p:transition spd="med">
+        <p:fade/>
+      </p:transition>
+    </mc:Fallback>
+  </mc:AlternateContent>
+</p:sld>
+</file>
+
+<file path=ppt/slides/slide15.xml><?xml version="1.0" encoding="utf-8"?>
+<p:sld xmlns:a="http://schemas.openxmlformats.org/drawingml/2006/main" xmlns:r="http://schemas.openxmlformats.org/officeDocument/2006/relationships" xmlns:p="http://schemas.openxmlformats.org/presentationml/2006/main">
+  <p:cSld>
+    <p:spTree>
+      <p:nvGrpSpPr>
+        <p:cNvPr id="1" name=""/>
+        <p:cNvGrpSpPr/>
+        <p:nvPr/>
+      </p:nvGrpSpPr>
+      <p:grpSpPr>
+        <a:xfrm>
+          <a:off x="0" y="0"/>
+          <a:ext cx="0" cy="0"/>
+          <a:chOff x="0" y="0"/>
+          <a:chExt cx="0" cy="0"/>
+        </a:xfrm>
+      </p:grpSpPr>
+      <p:sp>
+        <p:nvSpPr>
+          <p:cNvPr id="2" name="Cím 1">
+            <a:extLst>
+              <a:ext uri="{FF2B5EF4-FFF2-40B4-BE49-F238E27FC236}">
+                <a16:creationId xmlns:a16="http://schemas.microsoft.com/office/drawing/2014/main" id="{358A7884-8B4B-4E70-8461-BE3A61A8A3AC}"/>
+              </a:ext>
+            </a:extLst>
+          </p:cNvPr>
+          <p:cNvSpPr>
+            <a:spLocks noGrp="1"/>
+          </p:cNvSpPr>
+          <p:nvPr>
+            <p:ph type="title"/>
+          </p:nvPr>
+        </p:nvSpPr>
+        <p:spPr/>
+        <p:txBody>
+          <a:bodyPr/>
+          <a:lstStyle/>
+          <a:p>
+            <a:r>
+              <a:rPr lang="hu-HU" dirty="0"/>
+              <a:t>Szerzőre keresés területtel együtt</a:t>
+            </a:r>
+          </a:p>
+        </p:txBody>
+      </p:sp>
+      <p:sp>
+        <p:nvSpPr>
+          <p:cNvPr id="3" name="Tartalom helye 2">
+            <a:extLst>
+              <a:ext uri="{FF2B5EF4-FFF2-40B4-BE49-F238E27FC236}">
+                <a16:creationId xmlns:a16="http://schemas.microsoft.com/office/drawing/2014/main" id="{8C36CDF2-8F05-43E2-B1B6-58092FEA37D5}"/>
+              </a:ext>
+            </a:extLst>
+          </p:cNvPr>
+          <p:cNvSpPr>
+            <a:spLocks noGrp="1"/>
+          </p:cNvSpPr>
+          <p:nvPr>
+            <p:ph sz="half" idx="1"/>
+          </p:nvPr>
+        </p:nvSpPr>
+        <p:spPr/>
+        <p:txBody>
+          <a:bodyPr/>
+          <a:lstStyle/>
+          <a:p>
+            <a:endParaRPr lang="hu-HU"/>
+          </a:p>
+        </p:txBody>
+      </p:sp>
+      <p:pic>
+        <p:nvPicPr>
+          <p:cNvPr id="5" name="Tartalom helye 4">
+            <a:extLst>
+              <a:ext uri="{FF2B5EF4-FFF2-40B4-BE49-F238E27FC236}">
+                <a16:creationId xmlns:a16="http://schemas.microsoft.com/office/drawing/2014/main" id="{A0C5285F-74A9-4FFE-A762-D582C8C52B75}"/>
+              </a:ext>
+            </a:extLst>
+          </p:cNvPr>
+          <p:cNvPicPr>
+            <a:picLocks noGrp="1" noChangeAspect="1"/>
+          </p:cNvPicPr>
+          <p:nvPr>
+            <p:ph sz="half" idx="2"/>
+          </p:nvPr>
+        </p:nvPicPr>
+        <p:blipFill>
+          <a:blip r:embed="rId2"/>
+          <a:stretch>
+            <a:fillRect/>
+          </a:stretch>
+        </p:blipFill>
+        <p:spPr>
+          <a:xfrm>
+            <a:off x="6297613" y="2097049"/>
+            <a:ext cx="4976812" cy="3679902"/>
+          </a:xfrm>
+          <a:prstGeom prst="rect">
+            <a:avLst/>
+          </a:prstGeom>
+        </p:spPr>
+      </p:pic>
+    </p:spTree>
+    <p:extLst>
+      <p:ext uri="{BB962C8B-B14F-4D97-AF65-F5344CB8AC3E}">
+        <p14:creationId xmlns:p14="http://schemas.microsoft.com/office/powerpoint/2010/main" val="3346490464"/>
+      </p:ext>
+    </p:extLst>
+  </p:cSld>
+  <p:clrMapOvr>
+    <a:masterClrMapping/>
+  </p:clrMapOvr>
+  <mc:AlternateContent xmlns:mc="http://schemas.openxmlformats.org/markup-compatibility/2006" xmlns:p14="http://schemas.microsoft.com/office/powerpoint/2010/main">
+    <mc:Choice Requires="p14">
+      <p:transition spd="med" p14:dur="700">
+        <p:fade/>
+      </p:transition>
+    </mc:Choice>
+    <mc:Fallback xmlns="">
+      <p:transition spd="med">
+        <p:fade/>
+      </p:transition>
+    </mc:Fallback>
+  </mc:AlternateContent>
+</p:sld>
+</file>
+
+<file path=ppt/slides/slide16.xml><?xml version="1.0" encoding="utf-8"?>
+<p:sld xmlns:a="http://schemas.openxmlformats.org/drawingml/2006/main" xmlns:r="http://schemas.openxmlformats.org/officeDocument/2006/relationships" xmlns:p="http://schemas.openxmlformats.org/presentationml/2006/main">
+  <p:cSld>
+    <p:spTree>
+      <p:nvGrpSpPr>
+        <p:cNvPr id="1" name=""/>
+        <p:cNvGrpSpPr/>
+        <p:nvPr/>
+      </p:nvGrpSpPr>
+      <p:grpSpPr>
+        <a:xfrm>
+          <a:off x="0" y="0"/>
+          <a:ext cx="0" cy="0"/>
+          <a:chOff x="0" y="0"/>
+          <a:chExt cx="0" cy="0"/>
+        </a:xfrm>
+      </p:grpSpPr>
+      <p:sp>
+        <p:nvSpPr>
+          <p:cNvPr id="2" name="Cím 1"/>
+          <p:cNvSpPr>
+            <a:spLocks noGrp="1"/>
+          </p:cNvSpPr>
+          <p:nvPr>
+            <p:ph type="title"/>
+          </p:nvPr>
+        </p:nvSpPr>
+        <p:spPr>
+          <a:xfrm>
+            <a:off x="693812" y="1628800"/>
+            <a:ext cx="7008574" cy="1930400"/>
+          </a:xfrm>
+        </p:spPr>
+        <p:txBody>
+          <a:bodyPr rtlCol="0"/>
+          <a:lstStyle/>
+          <a:p>
+            <a:pPr rtl="0"/>
+            <a:r>
+              <a:rPr lang="hu-HU" dirty="0"/>
+              <a:t>Köszönjük a figyelmet!</a:t>
+            </a:r>
+          </a:p>
+        </p:txBody>
+      </p:sp>
+      <p:sp>
+        <p:nvSpPr>
+          <p:cNvPr id="3" name="Szöveg helye 2"/>
+          <p:cNvSpPr>
+            <a:spLocks noGrp="1"/>
+          </p:cNvSpPr>
+          <p:nvPr>
+            <p:ph type="body" idx="1"/>
+          </p:nvPr>
+        </p:nvSpPr>
+        <p:spPr>
+          <a:xfrm>
+            <a:off x="721502" y="4580706"/>
+            <a:ext cx="7008574" cy="1296987"/>
+          </a:xfrm>
+        </p:spPr>
+        <p:txBody>
+          <a:bodyPr rtlCol="0"/>
+          <a:lstStyle/>
+          <a:p>
+            <a:pPr rtl="0"/>
+            <a:r>
+              <a:rPr lang="hu-HU" dirty="0"/>
+              <a:t>Kérdésekre szívesen válaszolunk!</a:t>
+            </a:r>
+          </a:p>
+        </p:txBody>
+      </p:sp>
+    </p:spTree>
+    <p:extLst>
+      <p:ext uri="{BB962C8B-B14F-4D97-AF65-F5344CB8AC3E}">
+        <p14:creationId xmlns:p14="http://schemas.microsoft.com/office/powerpoint/2010/main" val="1997697987"/>
+      </p:ext>
+    </p:extLst>
+  </p:cSld>
+  <p:clrMapOvr>
+    <a:masterClrMapping/>
+  </p:clrMapOvr>
+  <mc:AlternateContent xmlns:mc="http://schemas.openxmlformats.org/markup-compatibility/2006" xmlns:p14="http://schemas.microsoft.com/office/powerpoint/2010/main">
+    <mc:Choice Requires="p14">
+      <p:transition spd="med" p14:dur="700">
+        <p:fade/>
+      </p:transition>
+    </mc:Choice>
+    <mc:Fallback xmlns="">
+      <p:transition spd="med">
+        <p:fade/>
+      </p:transition>
+    </mc:Fallback>
+  </mc:AlternateContent>
+</p:sld>
+</file>
+
 <file path=ppt/slides/slide2.xml><?xml version="1.0" encoding="utf-8"?>
 <p:sld xmlns:a="http://schemas.openxmlformats.org/drawingml/2006/main" xmlns:r="http://schemas.openxmlformats.org/officeDocument/2006/relationships" xmlns:p="http://schemas.openxmlformats.org/presentationml/2006/main">
   <p:cSld>
@@ -7707,301 +8609,6 @@
 </file>
 
 <file path=ppt/slides/slide3.xml><?xml version="1.0" encoding="utf-8"?>
-<p:sld xmlns:a="http://schemas.openxmlformats.org/drawingml/2006/main" xmlns:r="http://schemas.openxmlformats.org/officeDocument/2006/relationships" xmlns:p="http://schemas.openxmlformats.org/presentationml/2006/main">
-  <p:cSld>
-    <p:spTree>
-      <p:nvGrpSpPr>
-        <p:cNvPr id="1" name=""/>
-        <p:cNvGrpSpPr/>
-        <p:nvPr/>
-      </p:nvGrpSpPr>
-      <p:grpSpPr>
-        <a:xfrm>
-          <a:off x="0" y="0"/>
-          <a:ext cx="0" cy="0"/>
-          <a:chOff x="0" y="0"/>
-          <a:chExt cx="0" cy="0"/>
-        </a:xfrm>
-      </p:grpSpPr>
-      <p:sp>
-        <p:nvSpPr>
-          <p:cNvPr id="2" name="Cím 1">
-            <a:extLst>
-              <a:ext uri="{FF2B5EF4-FFF2-40B4-BE49-F238E27FC236}">
-                <a16:creationId xmlns:a16="http://schemas.microsoft.com/office/drawing/2014/main" id="{ED233CB3-AEA1-44CB-950D-072D3E3D491B}"/>
-              </a:ext>
-            </a:extLst>
-          </p:cNvPr>
-          <p:cNvSpPr>
-            <a:spLocks noGrp="1"/>
-          </p:cNvSpPr>
-          <p:nvPr>
-            <p:ph type="title"/>
-          </p:nvPr>
-        </p:nvSpPr>
-        <p:spPr>
-          <a:xfrm>
-            <a:off x="1117309" y="76200"/>
-            <a:ext cx="10157354" cy="760512"/>
-          </a:xfrm>
-        </p:spPr>
-        <p:txBody>
-          <a:bodyPr anchor="b">
-            <a:normAutofit/>
-          </a:bodyPr>
-          <a:lstStyle/>
-          <a:p>
-            <a:r>
-              <a:rPr lang="hu-HU" dirty="0"/>
-              <a:t>MTMT</a:t>
-            </a:r>
-          </a:p>
-        </p:txBody>
-      </p:sp>
-      <p:sp>
-        <p:nvSpPr>
-          <p:cNvPr id="10" name="Text Placeholder 3">
-            <a:extLst>
-              <a:ext uri="{FF2B5EF4-FFF2-40B4-BE49-F238E27FC236}">
-                <a16:creationId xmlns:a16="http://schemas.microsoft.com/office/drawing/2014/main" id="{2319488E-AF7E-4326-BEA7-0E5910FC5BD8}"/>
-              </a:ext>
-            </a:extLst>
-          </p:cNvPr>
-          <p:cNvSpPr>
-            <a:spLocks noGrp="1"/>
-          </p:cNvSpPr>
-          <p:nvPr>
-            <p:ph idx="1"/>
-          </p:nvPr>
-        </p:nvSpPr>
-        <p:spPr>
-          <a:xfrm>
-            <a:off x="1117309" y="857300"/>
-            <a:ext cx="10157354" cy="4470400"/>
-          </a:xfrm>
-        </p:spPr>
-        <p:txBody>
-          <a:bodyPr/>
-          <a:lstStyle/>
-          <a:p>
-            <a:r>
-              <a:rPr lang="hu-HU" dirty="0"/>
-              <a:t>Példa keresés a Magyar Tudományos Művek tárában:</a:t>
-            </a:r>
-            <a:endParaRPr lang="en-US" dirty="0"/>
-          </a:p>
-        </p:txBody>
-      </p:sp>
-      <p:pic>
-        <p:nvPicPr>
-          <p:cNvPr id="6" name="Kép 5">
-            <a:extLst>
-              <a:ext uri="{FF2B5EF4-FFF2-40B4-BE49-F238E27FC236}">
-                <a16:creationId xmlns:a16="http://schemas.microsoft.com/office/drawing/2014/main" id="{54A226A7-8D25-4380-ADD6-CBADFAA6B28E}"/>
-              </a:ext>
-            </a:extLst>
-          </p:cNvPr>
-          <p:cNvPicPr>
-            <a:picLocks noChangeAspect="1"/>
-          </p:cNvPicPr>
-          <p:nvPr/>
-        </p:nvPicPr>
-        <p:blipFill>
-          <a:blip r:embed="rId2"/>
-          <a:stretch>
-            <a:fillRect/>
-          </a:stretch>
-        </p:blipFill>
-        <p:spPr>
-          <a:xfrm>
-            <a:off x="2133972" y="1532937"/>
-            <a:ext cx="8712968" cy="4934415"/>
-          </a:xfrm>
-          <a:prstGeom prst="rect">
-            <a:avLst/>
-          </a:prstGeom>
-        </p:spPr>
-      </p:pic>
-    </p:spTree>
-    <p:extLst>
-      <p:ext uri="{BB962C8B-B14F-4D97-AF65-F5344CB8AC3E}">
-        <p14:creationId xmlns:p14="http://schemas.microsoft.com/office/powerpoint/2010/main" val="86129528"/>
-      </p:ext>
-    </p:extLst>
-  </p:cSld>
-  <p:clrMapOvr>
-    <a:masterClrMapping/>
-  </p:clrMapOvr>
-  <mc:AlternateContent xmlns:mc="http://schemas.openxmlformats.org/markup-compatibility/2006" xmlns:p14="http://schemas.microsoft.com/office/powerpoint/2010/main">
-    <mc:Choice Requires="p14">
-      <p:transition spd="med" p14:dur="700">
-        <p:fade/>
-      </p:transition>
-    </mc:Choice>
-    <mc:Fallback xmlns="">
-      <p:transition spd="med">
-        <p:fade/>
-      </p:transition>
-    </mc:Fallback>
-  </mc:AlternateContent>
-</p:sld>
-</file>
-
-<file path=ppt/slides/slide4.xml><?xml version="1.0" encoding="utf-8"?>
-<p:sld xmlns:a="http://schemas.openxmlformats.org/drawingml/2006/main" xmlns:r="http://schemas.openxmlformats.org/officeDocument/2006/relationships" xmlns:p="http://schemas.openxmlformats.org/presentationml/2006/main">
-  <p:cSld>
-    <p:spTree>
-      <p:nvGrpSpPr>
-        <p:cNvPr id="1" name=""/>
-        <p:cNvGrpSpPr/>
-        <p:nvPr/>
-      </p:nvGrpSpPr>
-      <p:grpSpPr>
-        <a:xfrm>
-          <a:off x="0" y="0"/>
-          <a:ext cx="0" cy="0"/>
-          <a:chOff x="0" y="0"/>
-          <a:chExt cx="0" cy="0"/>
-        </a:xfrm>
-      </p:grpSpPr>
-      <p:sp>
-        <p:nvSpPr>
-          <p:cNvPr id="2" name="Cím 1">
-            <a:extLst>
-              <a:ext uri="{FF2B5EF4-FFF2-40B4-BE49-F238E27FC236}">
-                <a16:creationId xmlns:a16="http://schemas.microsoft.com/office/drawing/2014/main" id="{ED233CB3-AEA1-44CB-950D-072D3E3D491B}"/>
-              </a:ext>
-            </a:extLst>
-          </p:cNvPr>
-          <p:cNvSpPr>
-            <a:spLocks noGrp="1"/>
-          </p:cNvSpPr>
-          <p:nvPr>
-            <p:ph type="title"/>
-          </p:nvPr>
-        </p:nvSpPr>
-        <p:spPr>
-          <a:xfrm>
-            <a:off x="1117309" y="76200"/>
-            <a:ext cx="10157354" cy="832520"/>
-          </a:xfrm>
-        </p:spPr>
-        <p:txBody>
-          <a:bodyPr anchor="b">
-            <a:normAutofit/>
-          </a:bodyPr>
-          <a:lstStyle/>
-          <a:p>
-            <a:r>
-              <a:rPr lang="hu-HU" dirty="0"/>
-              <a:t>Google </a:t>
-            </a:r>
-            <a:r>
-              <a:rPr lang="hu-HU" dirty="0" err="1"/>
-              <a:t>Scholar</a:t>
-            </a:r>
-            <a:endParaRPr lang="hu-HU" dirty="0"/>
-          </a:p>
-        </p:txBody>
-      </p:sp>
-      <p:sp>
-        <p:nvSpPr>
-          <p:cNvPr id="10" name="Text Placeholder 3">
-            <a:extLst>
-              <a:ext uri="{FF2B5EF4-FFF2-40B4-BE49-F238E27FC236}">
-                <a16:creationId xmlns:a16="http://schemas.microsoft.com/office/drawing/2014/main" id="{2319488E-AF7E-4326-BEA7-0E5910FC5BD8}"/>
-              </a:ext>
-            </a:extLst>
-          </p:cNvPr>
-          <p:cNvSpPr>
-            <a:spLocks noGrp="1"/>
-          </p:cNvSpPr>
-          <p:nvPr>
-            <p:ph idx="1"/>
-          </p:nvPr>
-        </p:nvSpPr>
-        <p:spPr>
-          <a:xfrm>
-            <a:off x="1145402" y="942775"/>
-            <a:ext cx="10157354" cy="4470400"/>
-          </a:xfrm>
-        </p:spPr>
-        <p:txBody>
-          <a:bodyPr/>
-          <a:lstStyle/>
-          <a:p>
-            <a:r>
-              <a:rPr lang="hu-HU" dirty="0"/>
-              <a:t>Példa keresés a Google </a:t>
-            </a:r>
-            <a:r>
-              <a:rPr lang="hu-HU" dirty="0" err="1"/>
-              <a:t>Scholar</a:t>
-            </a:r>
-            <a:r>
-              <a:rPr lang="hu-HU" dirty="0"/>
-              <a:t>-ban:</a:t>
-            </a:r>
-            <a:endParaRPr lang="en-US" dirty="0"/>
-          </a:p>
-        </p:txBody>
-      </p:sp>
-      <p:pic>
-        <p:nvPicPr>
-          <p:cNvPr id="3" name="Kép 2">
-            <a:extLst>
-              <a:ext uri="{FF2B5EF4-FFF2-40B4-BE49-F238E27FC236}">
-                <a16:creationId xmlns:a16="http://schemas.microsoft.com/office/drawing/2014/main" id="{D2D633B3-CE21-416A-97C9-A0DD7F2C1FC8}"/>
-              </a:ext>
-            </a:extLst>
-          </p:cNvPr>
-          <p:cNvPicPr>
-            <a:picLocks noChangeAspect="1"/>
-          </p:cNvPicPr>
-          <p:nvPr/>
-        </p:nvPicPr>
-        <p:blipFill>
-          <a:blip r:embed="rId2"/>
-          <a:stretch>
-            <a:fillRect/>
-          </a:stretch>
-        </p:blipFill>
-        <p:spPr>
-          <a:xfrm>
-            <a:off x="2061964" y="1412776"/>
-            <a:ext cx="7754581" cy="4893668"/>
-          </a:xfrm>
-          <a:prstGeom prst="rect">
-            <a:avLst/>
-          </a:prstGeom>
-        </p:spPr>
-      </p:pic>
-    </p:spTree>
-    <p:extLst>
-      <p:ext uri="{BB962C8B-B14F-4D97-AF65-F5344CB8AC3E}">
-        <p14:creationId xmlns:p14="http://schemas.microsoft.com/office/powerpoint/2010/main" val="1015516298"/>
-      </p:ext>
-    </p:extLst>
-  </p:cSld>
-  <p:clrMapOvr>
-    <a:masterClrMapping/>
-  </p:clrMapOvr>
-  <mc:AlternateContent xmlns:mc="http://schemas.openxmlformats.org/markup-compatibility/2006" xmlns:p14="http://schemas.microsoft.com/office/powerpoint/2010/main">
-    <mc:Choice Requires="p14">
-      <p:transition spd="med" p14:dur="700">
-        <p:fade/>
-      </p:transition>
-    </mc:Choice>
-    <mc:Fallback xmlns="">
-      <p:transition spd="med">
-        <p:fade/>
-      </p:transition>
-    </mc:Fallback>
-  </mc:AlternateContent>
-</p:sld>
-</file>
-
-<file path=ppt/slides/slide5.xml><?xml version="1.0" encoding="utf-8"?>
 <p:sld xmlns:a="http://schemas.openxmlformats.org/drawingml/2006/main" xmlns:r="http://schemas.openxmlformats.org/officeDocument/2006/relationships" xmlns:p="http://schemas.openxmlformats.org/presentationml/2006/main">
   <p:cSld>
     <p:spTree>
@@ -8096,7 +8703,7 @@
 </p:sld>
 </file>
 
-<file path=ppt/slides/slide6.xml><?xml version="1.0" encoding="utf-8"?>
+<file path=ppt/slides/slide4.xml><?xml version="1.0" encoding="utf-8"?>
 <p:sld xmlns:a="http://schemas.openxmlformats.org/drawingml/2006/main" xmlns:r="http://schemas.openxmlformats.org/officeDocument/2006/relationships" xmlns:p="http://schemas.openxmlformats.org/presentationml/2006/main">
   <p:cSld>
     <p:spTree>
@@ -8165,7 +8772,7 @@
         <p:spPr>
           <a:xfrm>
             <a:off x="1117309" y="1701800"/>
-            <a:ext cx="5481159" cy="1727200"/>
+            <a:ext cx="6273247" cy="1727200"/>
           </a:xfrm>
         </p:spPr>
         <p:txBody>
@@ -8182,8 +8789,15 @@
             </a:r>
             <a:r>
               <a:rPr lang="hu-HU" dirty="0"/>
-              <a:t> nincs)</a:t>
+              <a:t> nincs) </a:t>
             </a:r>
+            <a:r>
+              <a:rPr lang="hu-HU" dirty="0">
+                <a:sym typeface="Wingdings" panose="05000000000000000000" pitchFamily="2" charset="2"/>
+              </a:rPr>
+              <a:t></a:t>
+            </a:r>
+            <a:endParaRPr lang="hu-HU" dirty="0"/>
           </a:p>
           <a:p>
             <a:r>
@@ -8258,6 +8872,275 @@
 </p:sld>
 </file>
 
+<file path=ppt/slides/slide5.xml><?xml version="1.0" encoding="utf-8"?>
+<p:sld xmlns:a="http://schemas.openxmlformats.org/drawingml/2006/main" xmlns:r="http://schemas.openxmlformats.org/officeDocument/2006/relationships" xmlns:p="http://schemas.openxmlformats.org/presentationml/2006/main">
+  <p:cSld>
+    <p:spTree>
+      <p:nvGrpSpPr>
+        <p:cNvPr id="1" name=""/>
+        <p:cNvGrpSpPr/>
+        <p:nvPr/>
+      </p:nvGrpSpPr>
+      <p:grpSpPr>
+        <a:xfrm>
+          <a:off x="0" y="0"/>
+          <a:ext cx="0" cy="0"/>
+          <a:chOff x="0" y="0"/>
+          <a:chExt cx="0" cy="0"/>
+        </a:xfrm>
+      </p:grpSpPr>
+      <p:sp>
+        <p:nvSpPr>
+          <p:cNvPr id="9" name="Title 1">
+            <a:extLst>
+              <a:ext uri="{FF2B5EF4-FFF2-40B4-BE49-F238E27FC236}">
+                <a16:creationId xmlns:a16="http://schemas.microsoft.com/office/drawing/2014/main" id="{02505436-7ED9-44F0-B8FA-DD3968997E48}"/>
+              </a:ext>
+            </a:extLst>
+          </p:cNvPr>
+          <p:cNvSpPr>
+            <a:spLocks noGrp="1"/>
+          </p:cNvSpPr>
+          <p:nvPr>
+            <p:ph type="title"/>
+          </p:nvPr>
+        </p:nvSpPr>
+        <p:spPr>
+          <a:xfrm>
+            <a:off x="1117309" y="76200"/>
+            <a:ext cx="10157354" cy="1397000"/>
+          </a:xfrm>
+        </p:spPr>
+        <p:txBody>
+          <a:bodyPr/>
+          <a:lstStyle/>
+          <a:p>
+            <a:r>
+              <a:rPr lang="hu-HU" dirty="0"/>
+              <a:t>MTMT kereső</a:t>
+            </a:r>
+            <a:endParaRPr lang="en-US" dirty="0"/>
+          </a:p>
+        </p:txBody>
+      </p:sp>
+      <p:pic>
+        <p:nvPicPr>
+          <p:cNvPr id="4" name="Kép 3">
+            <a:extLst>
+              <a:ext uri="{FF2B5EF4-FFF2-40B4-BE49-F238E27FC236}">
+                <a16:creationId xmlns:a16="http://schemas.microsoft.com/office/drawing/2014/main" id="{4019FD0B-71CC-4423-A28B-7D409EC5BF75}"/>
+              </a:ext>
+            </a:extLst>
+          </p:cNvPr>
+          <p:cNvPicPr>
+            <a:picLocks noChangeAspect="1"/>
+          </p:cNvPicPr>
+          <p:nvPr/>
+        </p:nvPicPr>
+        <p:blipFill>
+          <a:blip r:embed="rId2"/>
+          <a:stretch>
+            <a:fillRect/>
+          </a:stretch>
+        </p:blipFill>
+        <p:spPr>
+          <a:xfrm>
+            <a:off x="1117309" y="2101693"/>
+            <a:ext cx="4977104" cy="3670613"/>
+          </a:xfrm>
+          <a:prstGeom prst="rect">
+            <a:avLst/>
+          </a:prstGeom>
+          <a:noFill/>
+        </p:spPr>
+      </p:pic>
+      <p:pic>
+        <p:nvPicPr>
+          <p:cNvPr id="5" name="Tartalom helye 4">
+            <a:extLst>
+              <a:ext uri="{FF2B5EF4-FFF2-40B4-BE49-F238E27FC236}">
+                <a16:creationId xmlns:a16="http://schemas.microsoft.com/office/drawing/2014/main" id="{69881464-EF19-4CF4-9EFB-22AFCE2BA1B5}"/>
+              </a:ext>
+            </a:extLst>
+          </p:cNvPr>
+          <p:cNvPicPr>
+            <a:picLocks noGrp="1" noChangeAspect="1"/>
+          </p:cNvPicPr>
+          <p:nvPr>
+            <p:ph sz="half" idx="2"/>
+          </p:nvPr>
+        </p:nvPicPr>
+        <p:blipFill>
+          <a:blip r:embed="rId3"/>
+          <a:stretch>
+            <a:fillRect/>
+          </a:stretch>
+        </p:blipFill>
+        <p:spPr>
+          <a:xfrm>
+            <a:off x="6297613" y="2683442"/>
+            <a:ext cx="4976812" cy="2507115"/>
+          </a:xfrm>
+          <a:prstGeom prst="rect">
+            <a:avLst/>
+          </a:prstGeom>
+        </p:spPr>
+      </p:pic>
+    </p:spTree>
+    <p:extLst>
+      <p:ext uri="{BB962C8B-B14F-4D97-AF65-F5344CB8AC3E}">
+        <p14:creationId xmlns:p14="http://schemas.microsoft.com/office/powerpoint/2010/main" val="3500520587"/>
+      </p:ext>
+    </p:extLst>
+  </p:cSld>
+  <p:clrMapOvr>
+    <a:masterClrMapping/>
+  </p:clrMapOvr>
+  <mc:AlternateContent xmlns:mc="http://schemas.openxmlformats.org/markup-compatibility/2006" xmlns:p14="http://schemas.microsoft.com/office/powerpoint/2010/main">
+    <mc:Choice Requires="p14">
+      <p:transition spd="med" p14:dur="700">
+        <p:fade/>
+      </p:transition>
+    </mc:Choice>
+    <mc:Fallback xmlns="">
+      <p:transition spd="med">
+        <p:fade/>
+      </p:transition>
+    </mc:Fallback>
+  </mc:AlternateContent>
+</p:sld>
+</file>
+
+<file path=ppt/slides/slide6.xml><?xml version="1.0" encoding="utf-8"?>
+<p:sld xmlns:a="http://schemas.openxmlformats.org/drawingml/2006/main" xmlns:r="http://schemas.openxmlformats.org/officeDocument/2006/relationships" xmlns:p="http://schemas.openxmlformats.org/presentationml/2006/main">
+  <p:cSld>
+    <p:spTree>
+      <p:nvGrpSpPr>
+        <p:cNvPr id="1" name=""/>
+        <p:cNvGrpSpPr/>
+        <p:nvPr/>
+      </p:nvGrpSpPr>
+      <p:grpSpPr>
+        <a:xfrm>
+          <a:off x="0" y="0"/>
+          <a:ext cx="0" cy="0"/>
+          <a:chOff x="0" y="0"/>
+          <a:chExt cx="0" cy="0"/>
+        </a:xfrm>
+      </p:grpSpPr>
+      <p:sp>
+        <p:nvSpPr>
+          <p:cNvPr id="2" name="Cím 1">
+            <a:extLst>
+              <a:ext uri="{FF2B5EF4-FFF2-40B4-BE49-F238E27FC236}">
+                <a16:creationId xmlns:a16="http://schemas.microsoft.com/office/drawing/2014/main" id="{2B205C21-9814-4DB1-823B-00DC9796296C}"/>
+              </a:ext>
+            </a:extLst>
+          </p:cNvPr>
+          <p:cNvSpPr>
+            <a:spLocks noGrp="1"/>
+          </p:cNvSpPr>
+          <p:nvPr>
+            <p:ph type="title"/>
+          </p:nvPr>
+        </p:nvSpPr>
+        <p:spPr/>
+        <p:txBody>
+          <a:bodyPr/>
+          <a:lstStyle/>
+          <a:p>
+            <a:r>
+              <a:rPr lang="hu-HU" dirty="0"/>
+              <a:t>MTMT kereső - találati lista</a:t>
+            </a:r>
+          </a:p>
+        </p:txBody>
+      </p:sp>
+      <p:sp>
+        <p:nvSpPr>
+          <p:cNvPr id="3" name="Tartalom helye 2">
+            <a:extLst>
+              <a:ext uri="{FF2B5EF4-FFF2-40B4-BE49-F238E27FC236}">
+                <a16:creationId xmlns:a16="http://schemas.microsoft.com/office/drawing/2014/main" id="{35A9C775-1253-48B7-B1F2-E7524C34576C}"/>
+              </a:ext>
+            </a:extLst>
+          </p:cNvPr>
+          <p:cNvSpPr>
+            <a:spLocks noGrp="1"/>
+          </p:cNvSpPr>
+          <p:nvPr>
+            <p:ph idx="1"/>
+          </p:nvPr>
+        </p:nvSpPr>
+        <p:spPr>
+          <a:xfrm>
+            <a:off x="1117309" y="1701800"/>
+            <a:ext cx="4689071" cy="4470400"/>
+          </a:xfrm>
+        </p:spPr>
+        <p:txBody>
+          <a:bodyPr/>
+          <a:lstStyle/>
+          <a:p>
+            <a:endParaRPr lang="hu-HU" dirty="0"/>
+          </a:p>
+        </p:txBody>
+      </p:sp>
+      <p:pic>
+        <p:nvPicPr>
+          <p:cNvPr id="4" name="Kép 3">
+            <a:extLst>
+              <a:ext uri="{FF2B5EF4-FFF2-40B4-BE49-F238E27FC236}">
+                <a16:creationId xmlns:a16="http://schemas.microsoft.com/office/drawing/2014/main" id="{B334F197-8077-4464-8DA8-A17239AA04AD}"/>
+              </a:ext>
+            </a:extLst>
+          </p:cNvPr>
+          <p:cNvPicPr>
+            <a:picLocks noChangeAspect="1"/>
+          </p:cNvPicPr>
+          <p:nvPr/>
+        </p:nvPicPr>
+        <p:blipFill>
+          <a:blip r:embed="rId2"/>
+          <a:stretch>
+            <a:fillRect/>
+          </a:stretch>
+        </p:blipFill>
+        <p:spPr>
+          <a:xfrm>
+            <a:off x="4806713" y="1824836"/>
+            <a:ext cx="6476572" cy="4347364"/>
+          </a:xfrm>
+          <a:prstGeom prst="rect">
+            <a:avLst/>
+          </a:prstGeom>
+        </p:spPr>
+      </p:pic>
+    </p:spTree>
+    <p:extLst>
+      <p:ext uri="{BB962C8B-B14F-4D97-AF65-F5344CB8AC3E}">
+        <p14:creationId xmlns:p14="http://schemas.microsoft.com/office/powerpoint/2010/main" val="1221152145"/>
+      </p:ext>
+    </p:extLst>
+  </p:cSld>
+  <p:clrMapOvr>
+    <a:masterClrMapping/>
+  </p:clrMapOvr>
+  <mc:AlternateContent xmlns:mc="http://schemas.openxmlformats.org/markup-compatibility/2006" xmlns:p14="http://schemas.microsoft.com/office/powerpoint/2010/main">
+    <mc:Choice Requires="p14">
+      <p:transition spd="med" p14:dur="700">
+        <p:fade/>
+      </p:transition>
+    </mc:Choice>
+    <mc:Fallback xmlns="">
+      <p:transition spd="med">
+        <p:fade/>
+      </p:transition>
+    </mc:Fallback>
+  </mc:AlternateContent>
+</p:sld>
+</file>
+
 <file path=ppt/slides/slide7.xml><?xml version="1.0" encoding="utf-8"?>
 <p:sld xmlns:a="http://schemas.openxmlformats.org/drawingml/2006/main" xmlns:r="http://schemas.openxmlformats.org/officeDocument/2006/relationships" xmlns:p="http://schemas.openxmlformats.org/presentationml/2006/main">
   <p:cSld>
@@ -8277,10 +9160,10 @@
       </p:grpSpPr>
       <p:sp>
         <p:nvSpPr>
-          <p:cNvPr id="17" name="Title 1">
+          <p:cNvPr id="9" name="Title 1">
             <a:extLst>
               <a:ext uri="{FF2B5EF4-FFF2-40B4-BE49-F238E27FC236}">
-                <a16:creationId xmlns:a16="http://schemas.microsoft.com/office/drawing/2014/main" id="{551A2C01-A7F3-4648-833F-AC23B1BE5D49}"/>
+                <a16:creationId xmlns:a16="http://schemas.microsoft.com/office/drawing/2014/main" id="{B567B0B9-26FE-4D91-9147-5309A05A8E60}"/>
               </a:ext>
             </a:extLst>
           </p:cNvPr>
@@ -8294,7 +9177,7 @@
         <p:spPr>
           <a:xfrm>
             <a:off x="1117309" y="76200"/>
-            <a:ext cx="10157354" cy="884186"/>
+            <a:ext cx="10157354" cy="1397000"/>
           </a:xfrm>
         </p:spPr>
         <p:txBody>
@@ -8303,11 +9186,15 @@
           <a:p>
             <a:r>
               <a:rPr lang="hu-HU" dirty="0"/>
-              <a:t>MTMT adatok </a:t>
+              <a:t>Google </a:t>
             </a:r>
             <a:r>
               <a:rPr lang="hu-HU" dirty="0" err="1"/>
-              <a:t>webscraping-gel</a:t>
+              <a:t>Scholar</a:t>
+            </a:r>
+            <a:r>
+              <a:rPr lang="hu-HU" dirty="0"/>
+              <a:t> kereső - találati lista</a:t>
             </a:r>
             <a:endParaRPr lang="en-US" dirty="0"/>
           </a:p>
@@ -8315,10 +9202,10 @@
       </p:sp>
       <p:sp>
         <p:nvSpPr>
-          <p:cNvPr id="19" name="Content Placeholder 2">
+          <p:cNvPr id="11" name="Content Placeholder 2">
             <a:extLst>
               <a:ext uri="{FF2B5EF4-FFF2-40B4-BE49-F238E27FC236}">
-                <a16:creationId xmlns:a16="http://schemas.microsoft.com/office/drawing/2014/main" id="{708C1484-C179-406B-937D-4DDAB438D2D0}"/>
+                <a16:creationId xmlns:a16="http://schemas.microsoft.com/office/drawing/2014/main" id="{BF288350-D07F-4707-9A0B-00DCB14ACBF3}"/>
               </a:ext>
             </a:extLst>
           </p:cNvPr>
@@ -8331,31 +9218,24 @@
         </p:nvSpPr>
         <p:spPr>
           <a:xfrm>
-            <a:off x="1117309" y="1320678"/>
-            <a:ext cx="10089671" cy="1316234"/>
+            <a:off x="1117309" y="1701800"/>
+            <a:ext cx="4977104" cy="4470400"/>
           </a:xfrm>
         </p:spPr>
         <p:txBody>
           <a:bodyPr/>
           <a:lstStyle/>
           <a:p>
-            <a:pPr marL="0" indent="0">
-              <a:buNone/>
-            </a:pPr>
-            <a:r>
-              <a:rPr lang="hu-HU" dirty="0"/>
-              <a:t>Felhasználói felületen az MTMT oldalról kigyűjtött adatok megjelenítése</a:t>
-            </a:r>
             <a:endParaRPr lang="en-US" dirty="0"/>
           </a:p>
         </p:txBody>
       </p:sp>
       <p:pic>
         <p:nvPicPr>
-          <p:cNvPr id="6" name="Kép 5">
+          <p:cNvPr id="4" name="Kép 3">
             <a:extLst>
               <a:ext uri="{FF2B5EF4-FFF2-40B4-BE49-F238E27FC236}">
-                <a16:creationId xmlns:a16="http://schemas.microsoft.com/office/drawing/2014/main" id="{FFF3ED03-C3B1-4532-970E-CE53F18FE699}"/>
+                <a16:creationId xmlns:a16="http://schemas.microsoft.com/office/drawing/2014/main" id="{9CAD1A1E-DF11-4F8D-9371-EEDF3D67743B}"/>
               </a:ext>
             </a:extLst>
           </p:cNvPr>
@@ -8372,8 +9252,8 @@
         </p:blipFill>
         <p:spPr>
           <a:xfrm>
-            <a:off x="6526460" y="2712218"/>
-            <a:ext cx="4977104" cy="3036032"/>
+            <a:off x="6349926" y="1701800"/>
+            <a:ext cx="4872370" cy="4470400"/>
           </a:xfrm>
           <a:prstGeom prst="rect">
             <a:avLst/>
@@ -8381,398 +9261,10 @@
           <a:noFill/>
         </p:spPr>
       </p:pic>
-      <p:pic>
-        <p:nvPicPr>
-          <p:cNvPr id="11" name="Kép 10">
-            <a:extLst>
-              <a:ext uri="{FF2B5EF4-FFF2-40B4-BE49-F238E27FC236}">
-                <a16:creationId xmlns:a16="http://schemas.microsoft.com/office/drawing/2014/main" id="{5C68FABB-7CF2-4AE4-9B6A-F8F5F2C07103}"/>
-              </a:ext>
-            </a:extLst>
-          </p:cNvPr>
-          <p:cNvPicPr>
-            <a:picLocks noChangeAspect="1"/>
-          </p:cNvPicPr>
-          <p:nvPr/>
-        </p:nvPicPr>
-        <p:blipFill>
-          <a:blip r:embed="rId3"/>
-          <a:stretch>
-            <a:fillRect/>
-          </a:stretch>
-        </p:blipFill>
-        <p:spPr>
-          <a:xfrm>
-            <a:off x="833552" y="2712218"/>
-            <a:ext cx="5328592" cy="3017741"/>
-          </a:xfrm>
-          <a:prstGeom prst="rect">
-            <a:avLst/>
-          </a:prstGeom>
-        </p:spPr>
-      </p:pic>
-      <p:sp>
-        <p:nvSpPr>
-          <p:cNvPr id="21" name="Szabadkézi sokszög: alakzat 20">
-            <a:extLst>
-              <a:ext uri="{FF2B5EF4-FFF2-40B4-BE49-F238E27FC236}">
-                <a16:creationId xmlns:a16="http://schemas.microsoft.com/office/drawing/2014/main" id="{D7BA2930-EA45-4FEE-A807-D3241347BA30}"/>
-              </a:ext>
-            </a:extLst>
-          </p:cNvPr>
-          <p:cNvSpPr/>
-          <p:nvPr/>
-        </p:nvSpPr>
-        <p:spPr>
-          <a:xfrm>
-            <a:off x="2560320" y="2377256"/>
-            <a:ext cx="4650377" cy="1289053"/>
-          </a:xfrm>
-          <a:custGeom>
-            <a:avLst/>
-            <a:gdLst>
-              <a:gd name="connsiteX0" fmla="*/ 0 w 4650377"/>
-              <a:gd name="connsiteY0" fmla="*/ 1289053 h 1289053"/>
-              <a:gd name="connsiteX1" fmla="*/ 2272937 w 4650377"/>
-              <a:gd name="connsiteY1" fmla="*/ 184 h 1289053"/>
-              <a:gd name="connsiteX2" fmla="*/ 4650377 w 4650377"/>
-              <a:gd name="connsiteY2" fmla="*/ 1193258 h 1289053"/>
-            </a:gdLst>
-            <a:ahLst/>
-            <a:cxnLst>
-              <a:cxn ang="0">
-                <a:pos x="connsiteX0" y="connsiteY0"/>
-              </a:cxn>
-              <a:cxn ang="0">
-                <a:pos x="connsiteX1" y="connsiteY1"/>
-              </a:cxn>
-              <a:cxn ang="0">
-                <a:pos x="connsiteX2" y="connsiteY2"/>
-              </a:cxn>
-            </a:cxnLst>
-            <a:rect l="l" t="t" r="r" b="b"/>
-            <a:pathLst>
-              <a:path w="4650377" h="1289053">
-                <a:moveTo>
-                  <a:pt x="0" y="1289053"/>
-                </a:moveTo>
-                <a:cubicBezTo>
-                  <a:pt x="748937" y="652601"/>
-                  <a:pt x="1497874" y="16150"/>
-                  <a:pt x="2272937" y="184"/>
-                </a:cubicBezTo>
-                <a:cubicBezTo>
-                  <a:pt x="3048000" y="-15782"/>
-                  <a:pt x="4210594" y="1010378"/>
-                  <a:pt x="4650377" y="1193258"/>
-                </a:cubicBezTo>
-              </a:path>
-            </a:pathLst>
-          </a:custGeom>
-          <a:noFill/>
-        </p:spPr>
-        <p:style>
-          <a:lnRef idx="2">
-            <a:schemeClr val="accent1">
-              <a:shade val="50000"/>
-            </a:schemeClr>
-          </a:lnRef>
-          <a:fillRef idx="1">
-            <a:schemeClr val="accent1"/>
-          </a:fillRef>
-          <a:effectRef idx="0">
-            <a:schemeClr val="accent1"/>
-          </a:effectRef>
-          <a:fontRef idx="minor">
-            <a:schemeClr val="lt1"/>
-          </a:fontRef>
-        </p:style>
-        <p:txBody>
-          <a:bodyPr rtlCol="0" anchor="ctr"/>
-          <a:lstStyle/>
-          <a:p>
-            <a:pPr algn="ctr"/>
-            <a:endParaRPr lang="hu-HU"/>
-          </a:p>
-        </p:txBody>
-      </p:sp>
-      <p:sp>
-        <p:nvSpPr>
-          <p:cNvPr id="22" name="Szabadkézi sokszög: alakzat 21">
-            <a:extLst>
-              <a:ext uri="{FF2B5EF4-FFF2-40B4-BE49-F238E27FC236}">
-                <a16:creationId xmlns:a16="http://schemas.microsoft.com/office/drawing/2014/main" id="{1ABFF623-E206-4EDA-A40C-0B8AA3566ABA}"/>
-              </a:ext>
-            </a:extLst>
-          </p:cNvPr>
-          <p:cNvSpPr/>
-          <p:nvPr/>
-        </p:nvSpPr>
-        <p:spPr>
-          <a:xfrm>
-            <a:off x="2856411" y="3596640"/>
-            <a:ext cx="6705600" cy="374469"/>
-          </a:xfrm>
-          <a:custGeom>
-            <a:avLst/>
-            <a:gdLst>
-              <a:gd name="connsiteX0" fmla="*/ 0 w 6705600"/>
-              <a:gd name="connsiteY0" fmla="*/ 304800 h 374469"/>
-              <a:gd name="connsiteX1" fmla="*/ 879566 w 6705600"/>
-              <a:gd name="connsiteY1" fmla="*/ 374469 h 374469"/>
-              <a:gd name="connsiteX2" fmla="*/ 5042263 w 6705600"/>
-              <a:gd name="connsiteY2" fmla="*/ 339634 h 374469"/>
-              <a:gd name="connsiteX3" fmla="*/ 6705600 w 6705600"/>
-              <a:gd name="connsiteY3" fmla="*/ 0 h 374469"/>
-            </a:gdLst>
-            <a:ahLst/>
-            <a:cxnLst>
-              <a:cxn ang="0">
-                <a:pos x="connsiteX0" y="connsiteY0"/>
-              </a:cxn>
-              <a:cxn ang="0">
-                <a:pos x="connsiteX1" y="connsiteY1"/>
-              </a:cxn>
-              <a:cxn ang="0">
-                <a:pos x="connsiteX2" y="connsiteY2"/>
-              </a:cxn>
-              <a:cxn ang="0">
-                <a:pos x="connsiteX3" y="connsiteY3"/>
-              </a:cxn>
-            </a:cxnLst>
-            <a:rect l="l" t="t" r="r" b="b"/>
-            <a:pathLst>
-              <a:path w="6705600" h="374469">
-                <a:moveTo>
-                  <a:pt x="0" y="304800"/>
-                </a:moveTo>
-                <a:cubicBezTo>
-                  <a:pt x="19594" y="336731"/>
-                  <a:pt x="879566" y="374469"/>
-                  <a:pt x="879566" y="374469"/>
-                </a:cubicBezTo>
-                <a:lnTo>
-                  <a:pt x="5042263" y="339634"/>
-                </a:lnTo>
-                <a:cubicBezTo>
-                  <a:pt x="6013269" y="277223"/>
-                  <a:pt x="6418217" y="47897"/>
-                  <a:pt x="6705600" y="0"/>
-                </a:cubicBezTo>
-              </a:path>
-            </a:pathLst>
-          </a:custGeom>
-          <a:noFill/>
-        </p:spPr>
-        <p:style>
-          <a:lnRef idx="2">
-            <a:schemeClr val="accent1">
-              <a:shade val="50000"/>
-            </a:schemeClr>
-          </a:lnRef>
-          <a:fillRef idx="1">
-            <a:schemeClr val="accent1"/>
-          </a:fillRef>
-          <a:effectRef idx="0">
-            <a:schemeClr val="accent1"/>
-          </a:effectRef>
-          <a:fontRef idx="minor">
-            <a:schemeClr val="lt1"/>
-          </a:fontRef>
-        </p:style>
-        <p:txBody>
-          <a:bodyPr rtlCol="0" anchor="ctr"/>
-          <a:lstStyle/>
-          <a:p>
-            <a:pPr algn="ctr"/>
-            <a:endParaRPr lang="hu-HU"/>
-          </a:p>
-        </p:txBody>
-      </p:sp>
-      <p:sp>
-        <p:nvSpPr>
-          <p:cNvPr id="23" name="Szabadkézi sokszög: alakzat 22">
-            <a:extLst>
-              <a:ext uri="{FF2B5EF4-FFF2-40B4-BE49-F238E27FC236}">
-                <a16:creationId xmlns:a16="http://schemas.microsoft.com/office/drawing/2014/main" id="{9186B8C2-16BD-4917-AE3A-F618CE6BC758}"/>
-              </a:ext>
-            </a:extLst>
-          </p:cNvPr>
-          <p:cNvSpPr/>
-          <p:nvPr/>
-        </p:nvSpPr>
-        <p:spPr>
-          <a:xfrm>
-            <a:off x="2612571" y="3614057"/>
-            <a:ext cx="7942218" cy="570749"/>
-          </a:xfrm>
-          <a:custGeom>
-            <a:avLst/>
-            <a:gdLst>
-              <a:gd name="connsiteX0" fmla="*/ 0 w 7942218"/>
-              <a:gd name="connsiteY0" fmla="*/ 348343 h 570749"/>
-              <a:gd name="connsiteX1" fmla="*/ 975360 w 7942218"/>
-              <a:gd name="connsiteY1" fmla="*/ 487680 h 570749"/>
-              <a:gd name="connsiteX2" fmla="*/ 4702629 w 7942218"/>
-              <a:gd name="connsiteY2" fmla="*/ 539932 h 570749"/>
-              <a:gd name="connsiteX3" fmla="*/ 7942218 w 7942218"/>
-              <a:gd name="connsiteY3" fmla="*/ 0 h 570749"/>
-            </a:gdLst>
-            <a:ahLst/>
-            <a:cxnLst>
-              <a:cxn ang="0">
-                <a:pos x="connsiteX0" y="connsiteY0"/>
-              </a:cxn>
-              <a:cxn ang="0">
-                <a:pos x="connsiteX1" y="connsiteY1"/>
-              </a:cxn>
-              <a:cxn ang="0">
-                <a:pos x="connsiteX2" y="connsiteY2"/>
-              </a:cxn>
-              <a:cxn ang="0">
-                <a:pos x="connsiteX3" y="connsiteY3"/>
-              </a:cxn>
-            </a:cxnLst>
-            <a:rect l="l" t="t" r="r" b="b"/>
-            <a:pathLst>
-              <a:path w="7942218" h="570749">
-                <a:moveTo>
-                  <a:pt x="0" y="348343"/>
-                </a:moveTo>
-                <a:cubicBezTo>
-                  <a:pt x="95794" y="402046"/>
-                  <a:pt x="191589" y="455749"/>
-                  <a:pt x="975360" y="487680"/>
-                </a:cubicBezTo>
-                <a:cubicBezTo>
-                  <a:pt x="1759131" y="519611"/>
-                  <a:pt x="3541486" y="621212"/>
-                  <a:pt x="4702629" y="539932"/>
-                </a:cubicBezTo>
-                <a:cubicBezTo>
-                  <a:pt x="5863772" y="458652"/>
-                  <a:pt x="7381967" y="88537"/>
-                  <a:pt x="7942218" y="0"/>
-                </a:cubicBezTo>
-              </a:path>
-            </a:pathLst>
-          </a:custGeom>
-          <a:noFill/>
-        </p:spPr>
-        <p:style>
-          <a:lnRef idx="2">
-            <a:schemeClr val="accent1">
-              <a:shade val="50000"/>
-            </a:schemeClr>
-          </a:lnRef>
-          <a:fillRef idx="1">
-            <a:schemeClr val="accent1"/>
-          </a:fillRef>
-          <a:effectRef idx="0">
-            <a:schemeClr val="accent1"/>
-          </a:effectRef>
-          <a:fontRef idx="minor">
-            <a:schemeClr val="lt1"/>
-          </a:fontRef>
-        </p:style>
-        <p:txBody>
-          <a:bodyPr rtlCol="0" anchor="ctr"/>
-          <a:lstStyle/>
-          <a:p>
-            <a:pPr algn="ctr"/>
-            <a:endParaRPr lang="hu-HU"/>
-          </a:p>
-        </p:txBody>
-      </p:sp>
-      <p:sp>
-        <p:nvSpPr>
-          <p:cNvPr id="2" name="Szabadkézi sokszög: alakzat 1">
-            <a:extLst>
-              <a:ext uri="{FF2B5EF4-FFF2-40B4-BE49-F238E27FC236}">
-                <a16:creationId xmlns:a16="http://schemas.microsoft.com/office/drawing/2014/main" id="{506A44D8-8355-4C95-AC4A-9871BDFE5475}"/>
-              </a:ext>
-            </a:extLst>
-          </p:cNvPr>
-          <p:cNvSpPr/>
-          <p:nvPr/>
-        </p:nvSpPr>
-        <p:spPr>
-          <a:xfrm>
-            <a:off x="3181739" y="2835186"/>
-            <a:ext cx="5001208" cy="943712"/>
-          </a:xfrm>
-          <a:custGeom>
-            <a:avLst/>
-            <a:gdLst>
-              <a:gd name="connsiteX0" fmla="*/ 0 w 5001208"/>
-              <a:gd name="connsiteY0" fmla="*/ 943712 h 943712"/>
-              <a:gd name="connsiteX1" fmla="*/ 2174032 w 5001208"/>
-              <a:gd name="connsiteY1" fmla="*/ 1320 h 943712"/>
-              <a:gd name="connsiteX2" fmla="*/ 5001208 w 5001208"/>
-              <a:gd name="connsiteY2" fmla="*/ 738438 h 943712"/>
-            </a:gdLst>
-            <a:ahLst/>
-            <a:cxnLst>
-              <a:cxn ang="0">
-                <a:pos x="connsiteX0" y="connsiteY0"/>
-              </a:cxn>
-              <a:cxn ang="0">
-                <a:pos x="connsiteX1" y="connsiteY1"/>
-              </a:cxn>
-              <a:cxn ang="0">
-                <a:pos x="connsiteX2" y="connsiteY2"/>
-              </a:cxn>
-            </a:cxnLst>
-            <a:rect l="l" t="t" r="r" b="b"/>
-            <a:pathLst>
-              <a:path w="5001208" h="943712">
-                <a:moveTo>
-                  <a:pt x="0" y="943712"/>
-                </a:moveTo>
-                <a:cubicBezTo>
-                  <a:pt x="670248" y="489622"/>
-                  <a:pt x="1340497" y="35532"/>
-                  <a:pt x="2174032" y="1320"/>
-                </a:cubicBezTo>
-                <a:cubicBezTo>
-                  <a:pt x="3007567" y="-32892"/>
-                  <a:pt x="4481804" y="607809"/>
-                  <a:pt x="5001208" y="738438"/>
-                </a:cubicBezTo>
-              </a:path>
-            </a:pathLst>
-          </a:custGeom>
-          <a:noFill/>
-        </p:spPr>
-        <p:style>
-          <a:lnRef idx="2">
-            <a:schemeClr val="accent1">
-              <a:shade val="50000"/>
-            </a:schemeClr>
-          </a:lnRef>
-          <a:fillRef idx="1">
-            <a:schemeClr val="accent1"/>
-          </a:fillRef>
-          <a:effectRef idx="0">
-            <a:schemeClr val="accent1"/>
-          </a:effectRef>
-          <a:fontRef idx="minor">
-            <a:schemeClr val="lt1"/>
-          </a:fontRef>
-        </p:style>
-        <p:txBody>
-          <a:bodyPr rtlCol="0" anchor="ctr"/>
-          <a:lstStyle/>
-          <a:p>
-            <a:pPr algn="ctr"/>
-            <a:endParaRPr lang="hu-HU"/>
-          </a:p>
-        </p:txBody>
-      </p:sp>
     </p:spTree>
     <p:extLst>
       <p:ext uri="{BB962C8B-B14F-4D97-AF65-F5344CB8AC3E}">
-        <p14:creationId xmlns:p14="http://schemas.microsoft.com/office/powerpoint/2010/main" val="3162124416"/>
+        <p14:creationId xmlns:p14="http://schemas.microsoft.com/office/powerpoint/2010/main" val="6619219"/>
       </p:ext>
     </p:extLst>
   </p:cSld>
@@ -8816,7 +9308,7 @@
           <p:cNvPr id="2" name="Cím 1">
             <a:extLst>
               <a:ext uri="{FF2B5EF4-FFF2-40B4-BE49-F238E27FC236}">
-                <a16:creationId xmlns:a16="http://schemas.microsoft.com/office/drawing/2014/main" id="{A0A36B6F-784A-4893-A8DC-0F2660186496}"/>
+                <a16:creationId xmlns:a16="http://schemas.microsoft.com/office/drawing/2014/main" id="{5CC86007-CC77-4239-AACF-ED0893073172}"/>
               </a:ext>
             </a:extLst>
           </p:cNvPr>
@@ -8827,19 +9319,22 @@
             <p:ph type="title"/>
           </p:nvPr>
         </p:nvSpPr>
-        <p:spPr>
-          <a:xfrm>
-            <a:off x="1117309" y="76200"/>
-            <a:ext cx="10157354" cy="1552600"/>
-          </a:xfrm>
-        </p:spPr>
+        <p:spPr/>
         <p:txBody>
           <a:bodyPr/>
           <a:lstStyle/>
           <a:p>
             <a:r>
               <a:rPr lang="hu-HU" dirty="0"/>
-              <a:t>Főbb feladatok amin dolgozunk</a:t>
+              <a:t>Google </a:t>
+            </a:r>
+            <a:r>
+              <a:rPr lang="hu-HU" dirty="0" err="1"/>
+              <a:t>Scholar</a:t>
+            </a:r>
+            <a:r>
+              <a:rPr lang="hu-HU" dirty="0"/>
+              <a:t> API</a:t>
             </a:r>
           </a:p>
         </p:txBody>
@@ -8849,7 +9344,7 @@
           <p:cNvPr id="3" name="Tartalom helye 2">
             <a:extLst>
               <a:ext uri="{FF2B5EF4-FFF2-40B4-BE49-F238E27FC236}">
-                <a16:creationId xmlns:a16="http://schemas.microsoft.com/office/drawing/2014/main" id="{DD30A49F-A42D-4B8F-8F96-C27F1BCEF371}"/>
+                <a16:creationId xmlns:a16="http://schemas.microsoft.com/office/drawing/2014/main" id="{7571B6D9-B46C-463F-A6E4-DAB04674E8AB}"/>
               </a:ext>
             </a:extLst>
           </p:cNvPr>
@@ -8862,53 +9357,52 @@
         </p:nvSpPr>
         <p:spPr>
           <a:xfrm>
-            <a:off x="1117309" y="2420888"/>
-            <a:ext cx="10157354" cy="3751312"/>
+            <a:off x="1117309" y="1701800"/>
+            <a:ext cx="5625175" cy="4470400"/>
           </a:xfrm>
         </p:spPr>
         <p:txBody>
           <a:bodyPr/>
           <a:lstStyle/>
           <a:p>
-            <a:r>
-              <a:rPr lang="hu-HU" dirty="0"/>
-              <a:t>Google </a:t>
-            </a:r>
-            <a:r>
-              <a:rPr lang="hu-HU" dirty="0" err="1"/>
-              <a:t>Scholar-ról</a:t>
-            </a:r>
-            <a:r>
-              <a:rPr lang="hu-HU" dirty="0"/>
-              <a:t> adatok kigyűjtése</a:t>
-            </a:r>
-          </a:p>
-          <a:p>
-            <a:r>
-              <a:rPr lang="hu-HU" dirty="0"/>
-              <a:t>MTMT – Google </a:t>
-            </a:r>
-            <a:r>
-              <a:rPr lang="hu-HU" dirty="0" err="1"/>
-              <a:t>Scholar</a:t>
-            </a:r>
-            <a:r>
-              <a:rPr lang="hu-HU" dirty="0"/>
-              <a:t> adatok összehasonlítása</a:t>
-            </a:r>
-          </a:p>
-          <a:p>
-            <a:r>
-              <a:rPr lang="hu-HU" dirty="0"/>
-              <a:t>Különbségek megjelenítése</a:t>
-            </a:r>
+            <a:endParaRPr lang="hu-HU" dirty="0"/>
           </a:p>
         </p:txBody>
       </p:sp>
+      <p:pic>
+        <p:nvPicPr>
+          <p:cNvPr id="4" name="Kép 3">
+            <a:extLst>
+              <a:ext uri="{FF2B5EF4-FFF2-40B4-BE49-F238E27FC236}">
+                <a16:creationId xmlns:a16="http://schemas.microsoft.com/office/drawing/2014/main" id="{6E15AE58-3EFB-49E5-919A-D75E244019FD}"/>
+              </a:ext>
+            </a:extLst>
+          </p:cNvPr>
+          <p:cNvPicPr>
+            <a:picLocks noChangeAspect="1"/>
+          </p:cNvPicPr>
+          <p:nvPr/>
+        </p:nvPicPr>
+        <p:blipFill>
+          <a:blip r:embed="rId2"/>
+          <a:stretch>
+            <a:fillRect/>
+          </a:stretch>
+        </p:blipFill>
+        <p:spPr>
+          <a:xfrm>
+            <a:off x="3929896" y="3429000"/>
+            <a:ext cx="7556515" cy="2858368"/>
+          </a:xfrm>
+          <a:prstGeom prst="rect">
+            <a:avLst/>
+          </a:prstGeom>
+        </p:spPr>
+      </p:pic>
     </p:spTree>
     <p:extLst>
       <p:ext uri="{BB962C8B-B14F-4D97-AF65-F5344CB8AC3E}">
-        <p14:creationId xmlns:p14="http://schemas.microsoft.com/office/powerpoint/2010/main" val="3018540761"/>
+        <p14:creationId xmlns:p14="http://schemas.microsoft.com/office/powerpoint/2010/main" val="3511898306"/>
       </p:ext>
     </p:extLst>
   </p:cSld>
@@ -8949,7 +9443,13 @@
       </p:grpSpPr>
       <p:sp>
         <p:nvSpPr>
-          <p:cNvPr id="2" name="Cím 1"/>
+          <p:cNvPr id="9" name="Title 1">
+            <a:extLst>
+              <a:ext uri="{FF2B5EF4-FFF2-40B4-BE49-F238E27FC236}">
+                <a16:creationId xmlns:a16="http://schemas.microsoft.com/office/drawing/2014/main" id="{D3DC08C8-464B-4FA2-8D05-461857C595D6}"/>
+              </a:ext>
+            </a:extLst>
+          </p:cNvPr>
           <p:cNvSpPr>
             <a:spLocks noGrp="1"/>
           </p:cNvSpPr>
@@ -8959,54 +9459,87 @@
         </p:nvSpPr>
         <p:spPr>
           <a:xfrm>
-            <a:off x="693812" y="1628800"/>
-            <a:ext cx="7008574" cy="1930400"/>
+            <a:off x="1117309" y="76200"/>
+            <a:ext cx="10157354" cy="1397000"/>
           </a:xfrm>
         </p:spPr>
         <p:txBody>
-          <a:bodyPr rtlCol="0"/>
+          <a:bodyPr/>
           <a:lstStyle/>
           <a:p>
-            <a:pPr rtl="0"/>
             <a:r>
               <a:rPr lang="hu-HU" dirty="0"/>
-              <a:t>Köszönjük a figyelmet!</a:t>
+              <a:t>Hibakezelés</a:t>
             </a:r>
+            <a:endParaRPr lang="en-US" dirty="0"/>
           </a:p>
         </p:txBody>
       </p:sp>
       <p:sp>
         <p:nvSpPr>
-          <p:cNvPr id="3" name="Szöveg helye 2"/>
+          <p:cNvPr id="11" name="Content Placeholder 2">
+            <a:extLst>
+              <a:ext uri="{FF2B5EF4-FFF2-40B4-BE49-F238E27FC236}">
+                <a16:creationId xmlns:a16="http://schemas.microsoft.com/office/drawing/2014/main" id="{DC3D6E1F-0588-4E0D-97EF-DC827B415804}"/>
+              </a:ext>
+            </a:extLst>
+          </p:cNvPr>
           <p:cNvSpPr>
             <a:spLocks noGrp="1"/>
           </p:cNvSpPr>
           <p:nvPr>
-            <p:ph type="body" idx="1"/>
+            <p:ph sz="half" idx="1"/>
           </p:nvPr>
         </p:nvSpPr>
         <p:spPr>
           <a:xfrm>
-            <a:off x="721502" y="4580706"/>
-            <a:ext cx="7008574" cy="1296987"/>
+            <a:off x="1117309" y="1701800"/>
+            <a:ext cx="4977104" cy="4470400"/>
           </a:xfrm>
         </p:spPr>
         <p:txBody>
-          <a:bodyPr rtlCol="0"/>
+          <a:bodyPr/>
           <a:lstStyle/>
           <a:p>
-            <a:pPr rtl="0"/>
-            <a:r>
-              <a:rPr lang="hu-HU" dirty="0"/>
-              <a:t>Kérdésekre szívesen válaszolunk!</a:t>
-            </a:r>
+            <a:endParaRPr lang="en-US"/>
           </a:p>
         </p:txBody>
       </p:sp>
+      <p:pic>
+        <p:nvPicPr>
+          <p:cNvPr id="4" name="Kép 3">
+            <a:extLst>
+              <a:ext uri="{FF2B5EF4-FFF2-40B4-BE49-F238E27FC236}">
+                <a16:creationId xmlns:a16="http://schemas.microsoft.com/office/drawing/2014/main" id="{D2BFFE19-525F-4ADE-A30C-CFD3C53C920B}"/>
+              </a:ext>
+            </a:extLst>
+          </p:cNvPr>
+          <p:cNvPicPr>
+            <a:picLocks noChangeAspect="1"/>
+          </p:cNvPicPr>
+          <p:nvPr/>
+        </p:nvPicPr>
+        <p:blipFill>
+          <a:blip r:embed="rId2"/>
+          <a:stretch>
+            <a:fillRect/>
+          </a:stretch>
+        </p:blipFill>
+        <p:spPr>
+          <a:xfrm>
+            <a:off x="6297559" y="2338105"/>
+            <a:ext cx="4977104" cy="3197789"/>
+          </a:xfrm>
+          <a:prstGeom prst="rect">
+            <a:avLst/>
+          </a:prstGeom>
+          <a:noFill/>
+        </p:spPr>
+      </p:pic>
     </p:spTree>
     <p:extLst>
       <p:ext uri="{BB962C8B-B14F-4D97-AF65-F5344CB8AC3E}">
-        <p14:creationId xmlns:p14="http://schemas.microsoft.com/office/powerpoint/2010/main" val="1997697987"/>
+        <p14:creationId xmlns:p14="http://schemas.microsoft.com/office/powerpoint/2010/main" val="3962352319"/>
       </p:ext>
     </p:extLst>
   </p:cSld>
@@ -9838,12 +10371,139 @@
 </file>
 
 <file path=customXml/item1.xml><?xml version="1.0" encoding="utf-8"?>
-<?mso-contentType ?>
-<FormTemplates xmlns="http://schemas.microsoft.com/sharepoint/v3/contenttype/forms">
-  <Display>DocumentLibraryForm</Display>
-  <Edit>AssetEditForm</Edit>
-  <New>DocumentLibraryForm</New>
-</FormTemplates>
+<p:properties xmlns:p="http://schemas.microsoft.com/office/2006/metadata/properties" xmlns:xsi="http://www.w3.org/2001/XMLSchema-instance" xmlns:pc="http://schemas.microsoft.com/office/infopath/2007/PartnerControls">
+  <documentManagement>
+    <LocPublishedLinkedAssetsLookup xmlns="4873beb7-5857-4685-be1f-d57550cc96cc" xsi:nil="true"/>
+    <ApprovalStatus xmlns="4873beb7-5857-4685-be1f-d57550cc96cc">InProgress</ApprovalStatus>
+    <MarketSpecific xmlns="4873beb7-5857-4685-be1f-d57550cc96cc">false</MarketSpecific>
+    <LocComments xmlns="4873beb7-5857-4685-be1f-d57550cc96cc" xsi:nil="true"/>
+    <LocLastLocAttemptVersionTypeLookup xmlns="4873beb7-5857-4685-be1f-d57550cc96cc" xsi:nil="true"/>
+    <DirectSourceMarket xmlns="4873beb7-5857-4685-be1f-d57550cc96cc" xsi:nil="true"/>
+    <ThumbnailAssetId xmlns="4873beb7-5857-4685-be1f-d57550cc96cc" xsi:nil="true"/>
+    <PrimaryImageGen xmlns="4873beb7-5857-4685-be1f-d57550cc96cc">false</PrimaryImageGen>
+    <LocNewPublishedVersionLookup xmlns="4873beb7-5857-4685-be1f-d57550cc96cc" xsi:nil="true"/>
+    <LegacyData xmlns="4873beb7-5857-4685-be1f-d57550cc96cc" xsi:nil="true"/>
+    <LocRecommendedHandoff xmlns="4873beb7-5857-4685-be1f-d57550cc96cc" xsi:nil="true"/>
+    <BusinessGroup xmlns="4873beb7-5857-4685-be1f-d57550cc96cc" xsi:nil="true"/>
+    <BlockPublish xmlns="4873beb7-5857-4685-be1f-d57550cc96cc">false</BlockPublish>
+    <TPFriendlyName xmlns="4873beb7-5857-4685-be1f-d57550cc96cc" xsi:nil="true"/>
+    <LocOverallPublishStatusLookup xmlns="4873beb7-5857-4685-be1f-d57550cc96cc" xsi:nil="true"/>
+    <NumericId xmlns="4873beb7-5857-4685-be1f-d57550cc96cc" xsi:nil="true"/>
+    <APEditor xmlns="4873beb7-5857-4685-be1f-d57550cc96cc">
+      <UserInfo>
+        <DisplayName/>
+        <AccountId xsi:nil="true"/>
+        <AccountType/>
+      </UserInfo>
+    </APEditor>
+    <SourceTitle xmlns="4873beb7-5857-4685-be1f-d57550cc96cc" xsi:nil="true"/>
+    <OpenTemplate xmlns="4873beb7-5857-4685-be1f-d57550cc96cc">true</OpenTemplate>
+    <LocOverallLocStatusLookup xmlns="4873beb7-5857-4685-be1f-d57550cc96cc" xsi:nil="true"/>
+    <UALocComments xmlns="4873beb7-5857-4685-be1f-d57550cc96cc" xsi:nil="true"/>
+    <ParentAssetId xmlns="4873beb7-5857-4685-be1f-d57550cc96cc" xsi:nil="true"/>
+    <IntlLangReviewDate xmlns="4873beb7-5857-4685-be1f-d57550cc96cc" xsi:nil="true"/>
+    <FeatureTagsTaxHTField0 xmlns="4873beb7-5857-4685-be1f-d57550cc96cc">
+      <Terms xmlns="http://schemas.microsoft.com/office/infopath/2007/PartnerControls"/>
+    </FeatureTagsTaxHTField0>
+    <PublishStatusLookup xmlns="4873beb7-5857-4685-be1f-d57550cc96cc">
+      <Value>1345039</Value>
+    </PublishStatusLookup>
+    <Providers xmlns="4873beb7-5857-4685-be1f-d57550cc96cc" xsi:nil="true"/>
+    <MachineTranslated xmlns="4873beb7-5857-4685-be1f-d57550cc96cc">false</MachineTranslated>
+    <OriginalSourceMarket xmlns="4873beb7-5857-4685-be1f-d57550cc96cc" xsi:nil="true"/>
+    <APDescription xmlns="4873beb7-5857-4685-be1f-d57550cc96cc">The bookstacks present on most slides  make this a good choice for students, teachers, reading enthusiasts, and others in education. This presentation template contains multiple slide layouts in widescreen format (16x9) and includes a sample table and chart that you can easily  modify.</APDescription>
+    <ClipArtFilename xmlns="4873beb7-5857-4685-be1f-d57550cc96cc" xsi:nil="true"/>
+    <ContentItem xmlns="4873beb7-5857-4685-be1f-d57550cc96cc" xsi:nil="true"/>
+    <TPInstallLocation xmlns="4873beb7-5857-4685-be1f-d57550cc96cc" xsi:nil="true"/>
+    <PublishTargets xmlns="4873beb7-5857-4685-be1f-d57550cc96cc">OfficeOnlineVNext</PublishTargets>
+    <TimesCloned xmlns="4873beb7-5857-4685-be1f-d57550cc96cc" xsi:nil="true"/>
+    <AssetStart xmlns="4873beb7-5857-4685-be1f-d57550cc96cc">2011-11-26T00:00:00+00:00</AssetStart>
+    <Provider xmlns="4873beb7-5857-4685-be1f-d57550cc96cc" xsi:nil="true"/>
+    <AcquiredFrom xmlns="4873beb7-5857-4685-be1f-d57550cc96cc">Internal MS</AcquiredFrom>
+    <FriendlyTitle xmlns="4873beb7-5857-4685-be1f-d57550cc96cc" xsi:nil="true"/>
+    <LastHandOff xmlns="4873beb7-5857-4685-be1f-d57550cc96cc" xsi:nil="true"/>
+    <TPClientViewer xmlns="4873beb7-5857-4685-be1f-d57550cc96cc" xsi:nil="true"/>
+    <TemplateStatus xmlns="4873beb7-5857-4685-be1f-d57550cc96cc">Complete</TemplateStatus>
+    <Downloads xmlns="4873beb7-5857-4685-be1f-d57550cc96cc">0</Downloads>
+    <OOCacheId xmlns="4873beb7-5857-4685-be1f-d57550cc96cc" xsi:nil="true"/>
+    <IsDeleted xmlns="4873beb7-5857-4685-be1f-d57550cc96cc">false</IsDeleted>
+    <LocPublishedDependentAssetsLookup xmlns="4873beb7-5857-4685-be1f-d57550cc96cc" xsi:nil="true"/>
+    <AssetExpire xmlns="4873beb7-5857-4685-be1f-d57550cc96cc">2029-05-12T07:00:00+00:00</AssetExpire>
+    <DSATActionTaken xmlns="4873beb7-5857-4685-be1f-d57550cc96cc" xsi:nil="true"/>
+    <CSXSubmissionMarket xmlns="4873beb7-5857-4685-be1f-d57550cc96cc" xsi:nil="true"/>
+    <TPExecutable xmlns="4873beb7-5857-4685-be1f-d57550cc96cc" xsi:nil="true"/>
+    <EditorialTags xmlns="4873beb7-5857-4685-be1f-d57550cc96cc" xsi:nil="true"/>
+    <SubmitterId xmlns="4873beb7-5857-4685-be1f-d57550cc96cc" xsi:nil="true"/>
+    <ApprovalLog xmlns="4873beb7-5857-4685-be1f-d57550cc96cc" xsi:nil="true"/>
+    <AssetType xmlns="4873beb7-5857-4685-be1f-d57550cc96cc">TP</AssetType>
+    <BugNumber xmlns="4873beb7-5857-4685-be1f-d57550cc96cc" xsi:nil="true"/>
+    <CSXSubmissionDate xmlns="4873beb7-5857-4685-be1f-d57550cc96cc" xsi:nil="true"/>
+    <CSXUpdate xmlns="4873beb7-5857-4685-be1f-d57550cc96cc">false</CSXUpdate>
+    <Milestone xmlns="4873beb7-5857-4685-be1f-d57550cc96cc" xsi:nil="true"/>
+    <RecommendationsModifier xmlns="4873beb7-5857-4685-be1f-d57550cc96cc" xsi:nil="true"/>
+    <OriginAsset xmlns="4873beb7-5857-4685-be1f-d57550cc96cc" xsi:nil="true"/>
+    <TPComponent xmlns="4873beb7-5857-4685-be1f-d57550cc96cc" xsi:nil="true"/>
+    <AssetId xmlns="4873beb7-5857-4685-be1f-d57550cc96cc">TP102787939</AssetId>
+    <IntlLocPriority xmlns="4873beb7-5857-4685-be1f-d57550cc96cc" xsi:nil="true"/>
+    <PolicheckWords xmlns="4873beb7-5857-4685-be1f-d57550cc96cc" xsi:nil="true"/>
+    <TPLaunchHelpLink xmlns="4873beb7-5857-4685-be1f-d57550cc96cc" xsi:nil="true"/>
+    <TPApplication xmlns="4873beb7-5857-4685-be1f-d57550cc96cc" xsi:nil="true"/>
+    <CrawlForDependencies xmlns="4873beb7-5857-4685-be1f-d57550cc96cc">false</CrawlForDependencies>
+    <HandoffToMSDN xmlns="4873beb7-5857-4685-be1f-d57550cc96cc" xsi:nil="true"/>
+    <PlannedPubDate xmlns="4873beb7-5857-4685-be1f-d57550cc96cc" xsi:nil="true"/>
+    <IntlLangReviewer xmlns="4873beb7-5857-4685-be1f-d57550cc96cc" xsi:nil="true"/>
+    <TrustLevel xmlns="4873beb7-5857-4685-be1f-d57550cc96cc">1 Microsoft Managed Content</TrustLevel>
+    <LocLastLocAttemptVersionLookup xmlns="4873beb7-5857-4685-be1f-d57550cc96cc">694216</LocLastLocAttemptVersionLookup>
+    <LocProcessedForHandoffsLookup xmlns="4873beb7-5857-4685-be1f-d57550cc96cc" xsi:nil="true"/>
+    <IsSearchable xmlns="4873beb7-5857-4685-be1f-d57550cc96cc">true</IsSearchable>
+    <TemplateTemplateType xmlns="4873beb7-5857-4685-be1f-d57550cc96cc">PowerPoint Presentation Template</TemplateTemplateType>
+    <CampaignTagsTaxHTField0 xmlns="4873beb7-5857-4685-be1f-d57550cc96cc">
+      <Terms xmlns="http://schemas.microsoft.com/office/infopath/2007/PartnerControls"/>
+    </CampaignTagsTaxHTField0>
+    <TPNamespace xmlns="4873beb7-5857-4685-be1f-d57550cc96cc" xsi:nil="true"/>
+    <LocOverallPreviewStatusLookup xmlns="4873beb7-5857-4685-be1f-d57550cc96cc" xsi:nil="true"/>
+    <TaxCatchAll xmlns="4873beb7-5857-4685-be1f-d57550cc96cc"/>
+    <Markets xmlns="4873beb7-5857-4685-be1f-d57550cc96cc"/>
+    <UAProjectedTotalWords xmlns="4873beb7-5857-4685-be1f-d57550cc96cc" xsi:nil="true"/>
+    <IntlLangReview xmlns="4873beb7-5857-4685-be1f-d57550cc96cc" xsi:nil="true"/>
+    <OutputCachingOn xmlns="4873beb7-5857-4685-be1f-d57550cc96cc">false</OutputCachingOn>
+    <AverageRating xmlns="4873beb7-5857-4685-be1f-d57550cc96cc" xsi:nil="true"/>
+    <APAuthor xmlns="4873beb7-5857-4685-be1f-d57550cc96cc">
+      <UserInfo>
+        <DisplayName>REDMOND\kristaa</DisplayName>
+        <AccountId>136</AccountId>
+        <AccountType/>
+      </UserInfo>
+    </APAuthor>
+    <LocManualTestRequired xmlns="4873beb7-5857-4685-be1f-d57550cc96cc">false</LocManualTestRequired>
+    <TPCommandLine xmlns="4873beb7-5857-4685-be1f-d57550cc96cc" xsi:nil="true"/>
+    <TPAppVersion xmlns="4873beb7-5857-4685-be1f-d57550cc96cc" xsi:nil="true"/>
+    <EditorialStatus xmlns="4873beb7-5857-4685-be1f-d57550cc96cc">Complete</EditorialStatus>
+    <LastModifiedDateTime xmlns="4873beb7-5857-4685-be1f-d57550cc96cc" xsi:nil="true"/>
+    <ScenarioTagsTaxHTField0 xmlns="4873beb7-5857-4685-be1f-d57550cc96cc">
+      <Terms xmlns="http://schemas.microsoft.com/office/infopath/2007/PartnerControls"/>
+    </ScenarioTagsTaxHTField0>
+    <LocProcessedForMarketsLookup xmlns="4873beb7-5857-4685-be1f-d57550cc96cc" xsi:nil="true"/>
+    <TPLaunchHelpLinkType xmlns="4873beb7-5857-4685-be1f-d57550cc96cc">Template</TPLaunchHelpLinkType>
+    <OriginalRelease xmlns="4873beb7-5857-4685-be1f-d57550cc96cc">15</OriginalRelease>
+    <LocalizationTagsTaxHTField0 xmlns="4873beb7-5857-4685-be1f-d57550cc96cc">
+      <Terms xmlns="http://schemas.microsoft.com/office/infopath/2007/PartnerControls"/>
+    </LocalizationTagsTaxHTField0>
+    <UACurrentWords xmlns="4873beb7-5857-4685-be1f-d57550cc96cc" xsi:nil="true"/>
+    <ArtSampleDocs xmlns="4873beb7-5857-4685-be1f-d57550cc96cc" xsi:nil="true"/>
+    <UALocRecommendation xmlns="4873beb7-5857-4685-be1f-d57550cc96cc">Localize</UALocRecommendation>
+    <Manager xmlns="4873beb7-5857-4685-be1f-d57550cc96cc" xsi:nil="true"/>
+    <LocOverallHandbackStatusLookup xmlns="4873beb7-5857-4685-be1f-d57550cc96cc" xsi:nil="true"/>
+    <ShowIn xmlns="4873beb7-5857-4685-be1f-d57550cc96cc">Show everywhere</ShowIn>
+    <UANotes xmlns="4873beb7-5857-4685-be1f-d57550cc96cc" xsi:nil="true"/>
+    <InternalTagsTaxHTField0 xmlns="4873beb7-5857-4685-be1f-d57550cc96cc">
+      <Terms xmlns="http://schemas.microsoft.com/office/infopath/2007/PartnerControls"/>
+    </InternalTagsTaxHTField0>
+    <CSXHash xmlns="4873beb7-5857-4685-be1f-d57550cc96cc" xsi:nil="true"/>
+    <VoteCount xmlns="4873beb7-5857-4685-be1f-d57550cc96cc" xsi:nil="true"/>
+    <LocMarketGroupTiers2 xmlns="4873beb7-5857-4685-be1f-d57550cc96cc" xsi:nil="true"/>
+  </documentManagement>
+</p:properties>
 </file>
 
 <file path=customXml/item2.xml><?xml version="1.0" encoding="utf-8"?>
@@ -10887,145 +11547,20 @@
 </file>
 
 <file path=customXml/item3.xml><?xml version="1.0" encoding="utf-8"?>
-<p:properties xmlns:p="http://schemas.microsoft.com/office/2006/metadata/properties" xmlns:xsi="http://www.w3.org/2001/XMLSchema-instance" xmlns:pc="http://schemas.microsoft.com/office/infopath/2007/PartnerControls">
-  <documentManagement>
-    <LocPublishedLinkedAssetsLookup xmlns="4873beb7-5857-4685-be1f-d57550cc96cc" xsi:nil="true"/>
-    <ApprovalStatus xmlns="4873beb7-5857-4685-be1f-d57550cc96cc">InProgress</ApprovalStatus>
-    <MarketSpecific xmlns="4873beb7-5857-4685-be1f-d57550cc96cc">false</MarketSpecific>
-    <LocComments xmlns="4873beb7-5857-4685-be1f-d57550cc96cc" xsi:nil="true"/>
-    <LocLastLocAttemptVersionTypeLookup xmlns="4873beb7-5857-4685-be1f-d57550cc96cc" xsi:nil="true"/>
-    <DirectSourceMarket xmlns="4873beb7-5857-4685-be1f-d57550cc96cc" xsi:nil="true"/>
-    <ThumbnailAssetId xmlns="4873beb7-5857-4685-be1f-d57550cc96cc" xsi:nil="true"/>
-    <PrimaryImageGen xmlns="4873beb7-5857-4685-be1f-d57550cc96cc">false</PrimaryImageGen>
-    <LocNewPublishedVersionLookup xmlns="4873beb7-5857-4685-be1f-d57550cc96cc" xsi:nil="true"/>
-    <LegacyData xmlns="4873beb7-5857-4685-be1f-d57550cc96cc" xsi:nil="true"/>
-    <LocRecommendedHandoff xmlns="4873beb7-5857-4685-be1f-d57550cc96cc" xsi:nil="true"/>
-    <BusinessGroup xmlns="4873beb7-5857-4685-be1f-d57550cc96cc" xsi:nil="true"/>
-    <BlockPublish xmlns="4873beb7-5857-4685-be1f-d57550cc96cc">false</BlockPublish>
-    <TPFriendlyName xmlns="4873beb7-5857-4685-be1f-d57550cc96cc" xsi:nil="true"/>
-    <LocOverallPublishStatusLookup xmlns="4873beb7-5857-4685-be1f-d57550cc96cc" xsi:nil="true"/>
-    <NumericId xmlns="4873beb7-5857-4685-be1f-d57550cc96cc" xsi:nil="true"/>
-    <APEditor xmlns="4873beb7-5857-4685-be1f-d57550cc96cc">
-      <UserInfo>
-        <DisplayName/>
-        <AccountId xsi:nil="true"/>
-        <AccountType/>
-      </UserInfo>
-    </APEditor>
-    <SourceTitle xmlns="4873beb7-5857-4685-be1f-d57550cc96cc" xsi:nil="true"/>
-    <OpenTemplate xmlns="4873beb7-5857-4685-be1f-d57550cc96cc">true</OpenTemplate>
-    <LocOverallLocStatusLookup xmlns="4873beb7-5857-4685-be1f-d57550cc96cc" xsi:nil="true"/>
-    <UALocComments xmlns="4873beb7-5857-4685-be1f-d57550cc96cc" xsi:nil="true"/>
-    <ParentAssetId xmlns="4873beb7-5857-4685-be1f-d57550cc96cc" xsi:nil="true"/>
-    <IntlLangReviewDate xmlns="4873beb7-5857-4685-be1f-d57550cc96cc" xsi:nil="true"/>
-    <FeatureTagsTaxHTField0 xmlns="4873beb7-5857-4685-be1f-d57550cc96cc">
-      <Terms xmlns="http://schemas.microsoft.com/office/infopath/2007/PartnerControls"/>
-    </FeatureTagsTaxHTField0>
-    <PublishStatusLookup xmlns="4873beb7-5857-4685-be1f-d57550cc96cc">
-      <Value>1345039</Value>
-    </PublishStatusLookup>
-    <Providers xmlns="4873beb7-5857-4685-be1f-d57550cc96cc" xsi:nil="true"/>
-    <MachineTranslated xmlns="4873beb7-5857-4685-be1f-d57550cc96cc">false</MachineTranslated>
-    <OriginalSourceMarket xmlns="4873beb7-5857-4685-be1f-d57550cc96cc" xsi:nil="true"/>
-    <APDescription xmlns="4873beb7-5857-4685-be1f-d57550cc96cc">The bookstacks present on most slides  make this a good choice for students, teachers, reading enthusiasts, and others in education. This presentation template contains multiple slide layouts in widescreen format (16x9) and includes a sample table and chart that you can easily  modify.</APDescription>
-    <ClipArtFilename xmlns="4873beb7-5857-4685-be1f-d57550cc96cc" xsi:nil="true"/>
-    <ContentItem xmlns="4873beb7-5857-4685-be1f-d57550cc96cc" xsi:nil="true"/>
-    <TPInstallLocation xmlns="4873beb7-5857-4685-be1f-d57550cc96cc" xsi:nil="true"/>
-    <PublishTargets xmlns="4873beb7-5857-4685-be1f-d57550cc96cc">OfficeOnlineVNext</PublishTargets>
-    <TimesCloned xmlns="4873beb7-5857-4685-be1f-d57550cc96cc" xsi:nil="true"/>
-    <AssetStart xmlns="4873beb7-5857-4685-be1f-d57550cc96cc">2011-11-26T00:00:00+00:00</AssetStart>
-    <Provider xmlns="4873beb7-5857-4685-be1f-d57550cc96cc" xsi:nil="true"/>
-    <AcquiredFrom xmlns="4873beb7-5857-4685-be1f-d57550cc96cc">Internal MS</AcquiredFrom>
-    <FriendlyTitle xmlns="4873beb7-5857-4685-be1f-d57550cc96cc" xsi:nil="true"/>
-    <LastHandOff xmlns="4873beb7-5857-4685-be1f-d57550cc96cc" xsi:nil="true"/>
-    <TPClientViewer xmlns="4873beb7-5857-4685-be1f-d57550cc96cc" xsi:nil="true"/>
-    <TemplateStatus xmlns="4873beb7-5857-4685-be1f-d57550cc96cc">Complete</TemplateStatus>
-    <Downloads xmlns="4873beb7-5857-4685-be1f-d57550cc96cc">0</Downloads>
-    <OOCacheId xmlns="4873beb7-5857-4685-be1f-d57550cc96cc" xsi:nil="true"/>
-    <IsDeleted xmlns="4873beb7-5857-4685-be1f-d57550cc96cc">false</IsDeleted>
-    <LocPublishedDependentAssetsLookup xmlns="4873beb7-5857-4685-be1f-d57550cc96cc" xsi:nil="true"/>
-    <AssetExpire xmlns="4873beb7-5857-4685-be1f-d57550cc96cc">2029-05-12T07:00:00+00:00</AssetExpire>
-    <DSATActionTaken xmlns="4873beb7-5857-4685-be1f-d57550cc96cc" xsi:nil="true"/>
-    <CSXSubmissionMarket xmlns="4873beb7-5857-4685-be1f-d57550cc96cc" xsi:nil="true"/>
-    <TPExecutable xmlns="4873beb7-5857-4685-be1f-d57550cc96cc" xsi:nil="true"/>
-    <EditorialTags xmlns="4873beb7-5857-4685-be1f-d57550cc96cc" xsi:nil="true"/>
-    <SubmitterId xmlns="4873beb7-5857-4685-be1f-d57550cc96cc" xsi:nil="true"/>
-    <ApprovalLog xmlns="4873beb7-5857-4685-be1f-d57550cc96cc" xsi:nil="true"/>
-    <AssetType xmlns="4873beb7-5857-4685-be1f-d57550cc96cc">TP</AssetType>
-    <BugNumber xmlns="4873beb7-5857-4685-be1f-d57550cc96cc" xsi:nil="true"/>
-    <CSXSubmissionDate xmlns="4873beb7-5857-4685-be1f-d57550cc96cc" xsi:nil="true"/>
-    <CSXUpdate xmlns="4873beb7-5857-4685-be1f-d57550cc96cc">false</CSXUpdate>
-    <Milestone xmlns="4873beb7-5857-4685-be1f-d57550cc96cc" xsi:nil="true"/>
-    <RecommendationsModifier xmlns="4873beb7-5857-4685-be1f-d57550cc96cc" xsi:nil="true"/>
-    <OriginAsset xmlns="4873beb7-5857-4685-be1f-d57550cc96cc" xsi:nil="true"/>
-    <TPComponent xmlns="4873beb7-5857-4685-be1f-d57550cc96cc" xsi:nil="true"/>
-    <AssetId xmlns="4873beb7-5857-4685-be1f-d57550cc96cc">TP102787939</AssetId>
-    <IntlLocPriority xmlns="4873beb7-5857-4685-be1f-d57550cc96cc" xsi:nil="true"/>
-    <PolicheckWords xmlns="4873beb7-5857-4685-be1f-d57550cc96cc" xsi:nil="true"/>
-    <TPLaunchHelpLink xmlns="4873beb7-5857-4685-be1f-d57550cc96cc" xsi:nil="true"/>
-    <TPApplication xmlns="4873beb7-5857-4685-be1f-d57550cc96cc" xsi:nil="true"/>
-    <CrawlForDependencies xmlns="4873beb7-5857-4685-be1f-d57550cc96cc">false</CrawlForDependencies>
-    <HandoffToMSDN xmlns="4873beb7-5857-4685-be1f-d57550cc96cc" xsi:nil="true"/>
-    <PlannedPubDate xmlns="4873beb7-5857-4685-be1f-d57550cc96cc" xsi:nil="true"/>
-    <IntlLangReviewer xmlns="4873beb7-5857-4685-be1f-d57550cc96cc" xsi:nil="true"/>
-    <TrustLevel xmlns="4873beb7-5857-4685-be1f-d57550cc96cc">1 Microsoft Managed Content</TrustLevel>
-    <LocLastLocAttemptVersionLookup xmlns="4873beb7-5857-4685-be1f-d57550cc96cc">694216</LocLastLocAttemptVersionLookup>
-    <LocProcessedForHandoffsLookup xmlns="4873beb7-5857-4685-be1f-d57550cc96cc" xsi:nil="true"/>
-    <IsSearchable xmlns="4873beb7-5857-4685-be1f-d57550cc96cc">true</IsSearchable>
-    <TemplateTemplateType xmlns="4873beb7-5857-4685-be1f-d57550cc96cc">PowerPoint Presentation Template</TemplateTemplateType>
-    <CampaignTagsTaxHTField0 xmlns="4873beb7-5857-4685-be1f-d57550cc96cc">
-      <Terms xmlns="http://schemas.microsoft.com/office/infopath/2007/PartnerControls"/>
-    </CampaignTagsTaxHTField0>
-    <TPNamespace xmlns="4873beb7-5857-4685-be1f-d57550cc96cc" xsi:nil="true"/>
-    <LocOverallPreviewStatusLookup xmlns="4873beb7-5857-4685-be1f-d57550cc96cc" xsi:nil="true"/>
-    <TaxCatchAll xmlns="4873beb7-5857-4685-be1f-d57550cc96cc"/>
-    <Markets xmlns="4873beb7-5857-4685-be1f-d57550cc96cc"/>
-    <UAProjectedTotalWords xmlns="4873beb7-5857-4685-be1f-d57550cc96cc" xsi:nil="true"/>
-    <IntlLangReview xmlns="4873beb7-5857-4685-be1f-d57550cc96cc" xsi:nil="true"/>
-    <OutputCachingOn xmlns="4873beb7-5857-4685-be1f-d57550cc96cc">false</OutputCachingOn>
-    <AverageRating xmlns="4873beb7-5857-4685-be1f-d57550cc96cc" xsi:nil="true"/>
-    <APAuthor xmlns="4873beb7-5857-4685-be1f-d57550cc96cc">
-      <UserInfo>
-        <DisplayName>REDMOND\kristaa</DisplayName>
-        <AccountId>136</AccountId>
-        <AccountType/>
-      </UserInfo>
-    </APAuthor>
-    <LocManualTestRequired xmlns="4873beb7-5857-4685-be1f-d57550cc96cc">false</LocManualTestRequired>
-    <TPCommandLine xmlns="4873beb7-5857-4685-be1f-d57550cc96cc" xsi:nil="true"/>
-    <TPAppVersion xmlns="4873beb7-5857-4685-be1f-d57550cc96cc" xsi:nil="true"/>
-    <EditorialStatus xmlns="4873beb7-5857-4685-be1f-d57550cc96cc">Complete</EditorialStatus>
-    <LastModifiedDateTime xmlns="4873beb7-5857-4685-be1f-d57550cc96cc" xsi:nil="true"/>
-    <ScenarioTagsTaxHTField0 xmlns="4873beb7-5857-4685-be1f-d57550cc96cc">
-      <Terms xmlns="http://schemas.microsoft.com/office/infopath/2007/PartnerControls"/>
-    </ScenarioTagsTaxHTField0>
-    <LocProcessedForMarketsLookup xmlns="4873beb7-5857-4685-be1f-d57550cc96cc" xsi:nil="true"/>
-    <TPLaunchHelpLinkType xmlns="4873beb7-5857-4685-be1f-d57550cc96cc">Template</TPLaunchHelpLinkType>
-    <OriginalRelease xmlns="4873beb7-5857-4685-be1f-d57550cc96cc">15</OriginalRelease>
-    <LocalizationTagsTaxHTField0 xmlns="4873beb7-5857-4685-be1f-d57550cc96cc">
-      <Terms xmlns="http://schemas.microsoft.com/office/infopath/2007/PartnerControls"/>
-    </LocalizationTagsTaxHTField0>
-    <UACurrentWords xmlns="4873beb7-5857-4685-be1f-d57550cc96cc" xsi:nil="true"/>
-    <ArtSampleDocs xmlns="4873beb7-5857-4685-be1f-d57550cc96cc" xsi:nil="true"/>
-    <UALocRecommendation xmlns="4873beb7-5857-4685-be1f-d57550cc96cc">Localize</UALocRecommendation>
-    <Manager xmlns="4873beb7-5857-4685-be1f-d57550cc96cc" xsi:nil="true"/>
-    <LocOverallHandbackStatusLookup xmlns="4873beb7-5857-4685-be1f-d57550cc96cc" xsi:nil="true"/>
-    <ShowIn xmlns="4873beb7-5857-4685-be1f-d57550cc96cc">Show everywhere</ShowIn>
-    <UANotes xmlns="4873beb7-5857-4685-be1f-d57550cc96cc" xsi:nil="true"/>
-    <InternalTagsTaxHTField0 xmlns="4873beb7-5857-4685-be1f-d57550cc96cc">
-      <Terms xmlns="http://schemas.microsoft.com/office/infopath/2007/PartnerControls"/>
-    </InternalTagsTaxHTField0>
-    <CSXHash xmlns="4873beb7-5857-4685-be1f-d57550cc96cc" xsi:nil="true"/>
-    <VoteCount xmlns="4873beb7-5857-4685-be1f-d57550cc96cc" xsi:nil="true"/>
-    <LocMarketGroupTiers2 xmlns="4873beb7-5857-4685-be1f-d57550cc96cc" xsi:nil="true"/>
-  </documentManagement>
-</p:properties>
+<?mso-contentType ?>
+<FormTemplates xmlns="http://schemas.microsoft.com/sharepoint/v3/contenttype/forms">
+  <Display>DocumentLibraryForm</Display>
+  <Edit>AssetEditForm</Edit>
+  <New>DocumentLibraryForm</New>
+</FormTemplates>
 </file>
 
 <file path=customXml/itemProps1.xml><?xml version="1.0" encoding="utf-8"?>
-<ds:datastoreItem xmlns:ds="http://schemas.openxmlformats.org/officeDocument/2006/customXml" ds:itemID="{E1B558C7-619B-49BE-9097-7FCBDADD4ECE}">
+<ds:datastoreItem xmlns:ds="http://schemas.openxmlformats.org/officeDocument/2006/customXml" ds:itemID="{F301D382-32B0-43EE-932C-28906AF37617}">
   <ds:schemaRefs>
-    <ds:schemaRef ds:uri="http://schemas.microsoft.com/sharepoint/v3/contenttype/forms"/>
+    <ds:schemaRef ds:uri="http://schemas.microsoft.com/office/2006/metadata/properties"/>
+    <ds:schemaRef ds:uri="http://schemas.microsoft.com/office/infopath/2007/PartnerControls"/>
+    <ds:schemaRef ds:uri="4873beb7-5857-4685-be1f-d57550cc96cc"/>
   </ds:schemaRefs>
 </ds:datastoreItem>
 </file>
@@ -11049,11 +11584,9 @@
 </file>
 
 <file path=customXml/itemProps3.xml><?xml version="1.0" encoding="utf-8"?>
-<ds:datastoreItem xmlns:ds="http://schemas.openxmlformats.org/officeDocument/2006/customXml" ds:itemID="{F301D382-32B0-43EE-932C-28906AF37617}">
+<ds:datastoreItem xmlns:ds="http://schemas.openxmlformats.org/officeDocument/2006/customXml" ds:itemID="{E1B558C7-619B-49BE-9097-7FCBDADD4ECE}">
   <ds:schemaRefs>
-    <ds:schemaRef ds:uri="http://schemas.microsoft.com/office/2006/metadata/properties"/>
-    <ds:schemaRef ds:uri="http://schemas.microsoft.com/office/infopath/2007/PartnerControls"/>
-    <ds:schemaRef ds:uri="4873beb7-5857-4685-be1f-d57550cc96cc"/>
+    <ds:schemaRef ds:uri="http://schemas.microsoft.com/sharepoint/v3/contenttype/forms"/>
   </ds:schemaRefs>
 </ds:datastoreItem>
 </file>
</xml_diff>